<commit_message>
added more markdown for lecture 1
</commit_message>
<xml_diff>
--- a/01_introduction_to_python/slides.pptx
+++ b/01_introduction_to_python/slides.pptx
@@ -5,13 +5,15 @@
     <p:sldMasterId id="2147483660" r:id="rId1"/>
   </p:sldMasterIdLst>
   <p:notesMasterIdLst>
-    <p:notesMasterId r:id="rId6"/>
+    <p:notesMasterId r:id="rId8"/>
   </p:notesMasterIdLst>
   <p:sldIdLst>
     <p:sldId id="256" r:id="rId2"/>
     <p:sldId id="258" r:id="rId3"/>
     <p:sldId id="259" r:id="rId4"/>
-    <p:sldId id="257" r:id="rId5"/>
+    <p:sldId id="261" r:id="rId5"/>
+    <p:sldId id="260" r:id="rId6"/>
+    <p:sldId id="257" r:id="rId7"/>
   </p:sldIdLst>
   <p:sldSz cx="9144000" cy="6858000" type="screen4x3"/>
   <p:notesSz cx="6858000" cy="9144000"/>
@@ -3950,7 +3952,7 @@
         <p:spPr>
           <a:xfrm>
             <a:off x="378372" y="1462087"/>
-            <a:ext cx="8040414" cy="523220"/>
+            <a:ext cx="8040414" cy="1384995"/>
           </a:xfrm>
           <a:prstGeom prst="rect">
             <a:avLst/>
@@ -3967,7 +3969,27 @@
               <a:rPr lang="en-US" sz="2800" dirty="0">
                 <a:latin typeface="Helvetica Light" panose="020B0403020202020204" pitchFamily="34" charset="0"/>
               </a:rPr>
-              <a:t>Option 2: execute a script </a:t>
+              <a:t>Option 2: execute a script, always have the extension of your script be ".</a:t>
+            </a:r>
+            <a:r>
+              <a:rPr lang="en-US" sz="2800" dirty="0" err="1">
+                <a:latin typeface="Helvetica Light" panose="020B0403020202020204" pitchFamily="34" charset="0"/>
+              </a:rPr>
+              <a:t>py</a:t>
+            </a:r>
+            <a:r>
+              <a:rPr lang="en-US" sz="2800" dirty="0">
+                <a:latin typeface="Helvetica Light" panose="020B0403020202020204" pitchFamily="34" charset="0"/>
+              </a:rPr>
+              <a:t>"</a:t>
+            </a:r>
+          </a:p>
+          <a:p>
+            <a:r>
+              <a:rPr lang="en-US" sz="2800" dirty="0">
+                <a:latin typeface="Helvetica Light" panose="020B0403020202020204" pitchFamily="34" charset="0"/>
+              </a:rPr>
+              <a:t> </a:t>
             </a:r>
           </a:p>
         </p:txBody>
@@ -3986,7 +4008,7 @@
         </p:nvSpPr>
         <p:spPr>
           <a:xfrm>
-            <a:off x="378372" y="2287370"/>
+            <a:off x="378372" y="2655232"/>
             <a:ext cx="8040414" cy="2246769"/>
           </a:xfrm>
           <a:prstGeom prst="rect">
@@ -4060,16 +4082,12 @@
           </a:p>
           <a:p>
             <a:r>
-              <a:rPr lang="en-US" sz="2800">
+              <a:rPr lang="en-US" sz="2800" dirty="0">
                 <a:latin typeface="Courier New" panose="02070309020205020404" pitchFamily="49" charset="0"/>
                 <a:cs typeface="Courier New" panose="02070309020205020404" pitchFamily="49" charset="0"/>
               </a:rPr>
-              <a:t>“hello world”</a:t>
-            </a:r>
-            <a:endParaRPr lang="en-US" sz="2800" dirty="0">
-              <a:latin typeface="Courier New" panose="02070309020205020404" pitchFamily="49" charset="0"/>
-              <a:cs typeface="Courier New" panose="02070309020205020404" pitchFamily="49" charset="0"/>
-            </a:endParaRPr>
+              <a:t>hello world</a:t>
+            </a:r>
           </a:p>
           <a:p>
             <a:endParaRPr lang="en-US" sz="2800" dirty="0">
@@ -4093,6 +4111,228 @@
 </file>
 
 <file path=ppt/slides/slide4.xml><?xml version="1.0" encoding="utf-8"?>
+<p:sld xmlns:a="http://schemas.openxmlformats.org/drawingml/2006/main" xmlns:r="http://schemas.openxmlformats.org/officeDocument/2006/relationships" xmlns:p="http://schemas.openxmlformats.org/presentationml/2006/main">
+  <p:cSld>
+    <p:spTree>
+      <p:nvGrpSpPr>
+        <p:cNvPr id="1" name=""/>
+        <p:cNvGrpSpPr/>
+        <p:nvPr/>
+      </p:nvGrpSpPr>
+      <p:grpSpPr>
+        <a:xfrm>
+          <a:off x="0" y="0"/>
+          <a:ext cx="0" cy="0"/>
+          <a:chOff x="0" y="0"/>
+          <a:chExt cx="0" cy="0"/>
+        </a:xfrm>
+      </p:grpSpPr>
+      <p:sp>
+        <p:nvSpPr>
+          <p:cNvPr id="4" name="Title 1">
+            <a:extLst>
+              <a:ext uri="{FF2B5EF4-FFF2-40B4-BE49-F238E27FC236}">
+                <a16:creationId xmlns:a16="http://schemas.microsoft.com/office/drawing/2014/main" id="{49CEAF47-07B0-1141-8746-222823DB5A0A}"/>
+              </a:ext>
+            </a:extLst>
+          </p:cNvPr>
+          <p:cNvSpPr>
+            <a:spLocks noGrp="1"/>
+          </p:cNvSpPr>
+          <p:nvPr>
+            <p:ph type="title"/>
+          </p:nvPr>
+        </p:nvSpPr>
+        <p:spPr>
+          <a:xfrm>
+            <a:off x="628650" y="136524"/>
+            <a:ext cx="7886700" cy="1325563"/>
+          </a:xfrm>
+        </p:spPr>
+        <p:txBody>
+          <a:bodyPr/>
+          <a:lstStyle/>
+          <a:p>
+            <a:r>
+              <a:rPr lang="en-US" dirty="0"/>
+              <a:t>Variable types</a:t>
+            </a:r>
+          </a:p>
+        </p:txBody>
+      </p:sp>
+      <p:sp>
+        <p:nvSpPr>
+          <p:cNvPr id="5" name="TextBox 4">
+            <a:extLst>
+              <a:ext uri="{FF2B5EF4-FFF2-40B4-BE49-F238E27FC236}">
+                <a16:creationId xmlns:a16="http://schemas.microsoft.com/office/drawing/2014/main" id="{4CCB6D70-3ED1-E54A-8756-59E3D01E88D4}"/>
+              </a:ext>
+            </a:extLst>
+          </p:cNvPr>
+          <p:cNvSpPr txBox="1"/>
+          <p:nvPr/>
+        </p:nvSpPr>
+        <p:spPr>
+          <a:xfrm>
+            <a:off x="378372" y="1462087"/>
+            <a:ext cx="8040414" cy="3539430"/>
+          </a:xfrm>
+          <a:prstGeom prst="rect">
+            <a:avLst/>
+          </a:prstGeom>
+          <a:noFill/>
+        </p:spPr>
+        <p:txBody>
+          <a:bodyPr wrap="square" rtlCol="0">
+            <a:spAutoFit/>
+          </a:bodyPr>
+          <a:lstStyle/>
+          <a:p>
+            <a:r>
+              <a:rPr lang="en-US" sz="2800" dirty="0">
+                <a:latin typeface="Helvetica Light" panose="020B0403020202020204" pitchFamily="34" charset="0"/>
+              </a:rPr>
+              <a:t>Numbers: 2, 3.14, 94504050</a:t>
+            </a:r>
+          </a:p>
+          <a:p>
+            <a:endParaRPr lang="en-US" sz="2800" dirty="0">
+              <a:latin typeface="Helvetica Light" panose="020B0403020202020204" pitchFamily="34" charset="0"/>
+            </a:endParaRPr>
+          </a:p>
+          <a:p>
+            <a:r>
+              <a:rPr lang="en-US" sz="2800" dirty="0">
+                <a:latin typeface="Helvetica Light" panose="020B0403020202020204" pitchFamily="34" charset="0"/>
+              </a:rPr>
+              <a:t>Strings: “hello”, ‘100’, “““ this </a:t>
+            </a:r>
+          </a:p>
+          <a:p>
+            <a:r>
+              <a:rPr lang="en-US" sz="2800" dirty="0">
+                <a:latin typeface="Helvetica Light" panose="020B0403020202020204" pitchFamily="34" charset="0"/>
+              </a:rPr>
+              <a:t>string has multiple lines”””</a:t>
+            </a:r>
+          </a:p>
+          <a:p>
+            <a:endParaRPr lang="en-US" sz="2800" dirty="0">
+              <a:latin typeface="Helvetica Light" panose="020B0403020202020204" pitchFamily="34" charset="0"/>
+            </a:endParaRPr>
+          </a:p>
+          <a:p>
+            <a:r>
+              <a:rPr lang="en-US" sz="2800" dirty="0">
+                <a:latin typeface="Helvetica Light" panose="020B0403020202020204" pitchFamily="34" charset="0"/>
+              </a:rPr>
+              <a:t>Lists: [1 , 2], [“this”, “is”, “a list”]</a:t>
+            </a:r>
+          </a:p>
+          <a:p>
+            <a:endParaRPr lang="en-US" sz="2800" dirty="0">
+              <a:latin typeface="Helvetica Light" panose="020B0403020202020204" pitchFamily="34" charset="0"/>
+            </a:endParaRPr>
+          </a:p>
+          <a:p>
+            <a:r>
+              <a:rPr lang="en-US" sz="2800" dirty="0">
+                <a:latin typeface="Helvetica Light" panose="020B0403020202020204" pitchFamily="34" charset="0"/>
+              </a:rPr>
+              <a:t>Dictionary: {0 : 1, 1 : 2}, {“key” : </a:t>
+            </a:r>
+            <a:r>
+              <a:rPr lang="en-US" sz="2800">
+                <a:latin typeface="Helvetica Light" panose="020B0403020202020204" pitchFamily="34" charset="0"/>
+              </a:rPr>
+              <a:t>“value” </a:t>
+            </a:r>
+            <a:r>
+              <a:rPr lang="en-US" sz="2800" dirty="0">
+                <a:latin typeface="Helvetica Light" panose="020B0403020202020204" pitchFamily="34" charset="0"/>
+              </a:rPr>
+              <a:t>} </a:t>
+            </a:r>
+          </a:p>
+        </p:txBody>
+      </p:sp>
+    </p:spTree>
+    <p:extLst>
+      <p:ext uri="{BB962C8B-B14F-4D97-AF65-F5344CB8AC3E}">
+        <p14:creationId xmlns:p14="http://schemas.microsoft.com/office/powerpoint/2010/main" val="3905333833"/>
+      </p:ext>
+    </p:extLst>
+  </p:cSld>
+  <p:clrMapOvr>
+    <a:masterClrMapping/>
+  </p:clrMapOvr>
+</p:sld>
+</file>
+
+<file path=ppt/slides/slide5.xml><?xml version="1.0" encoding="utf-8"?>
+<p:sld xmlns:a="http://schemas.openxmlformats.org/drawingml/2006/main" xmlns:r="http://schemas.openxmlformats.org/officeDocument/2006/relationships" xmlns:p="http://schemas.openxmlformats.org/presentationml/2006/main">
+  <p:cSld>
+    <p:spTree>
+      <p:nvGrpSpPr>
+        <p:cNvPr id="1" name=""/>
+        <p:cNvGrpSpPr/>
+        <p:nvPr/>
+      </p:nvGrpSpPr>
+      <p:grpSpPr>
+        <a:xfrm>
+          <a:off x="0" y="0"/>
+          <a:ext cx="0" cy="0"/>
+          <a:chOff x="0" y="0"/>
+          <a:chExt cx="0" cy="0"/>
+        </a:xfrm>
+      </p:grpSpPr>
+      <p:sp>
+        <p:nvSpPr>
+          <p:cNvPr id="5" name="Title 1">
+            <a:extLst>
+              <a:ext uri="{FF2B5EF4-FFF2-40B4-BE49-F238E27FC236}">
+                <a16:creationId xmlns:a16="http://schemas.microsoft.com/office/drawing/2014/main" id="{71D0CB43-13FE-8C41-87A9-00A791974839}"/>
+              </a:ext>
+            </a:extLst>
+          </p:cNvPr>
+          <p:cNvSpPr>
+            <a:spLocks noGrp="1"/>
+          </p:cNvSpPr>
+          <p:nvPr>
+            <p:ph type="title"/>
+          </p:nvPr>
+        </p:nvSpPr>
+        <p:spPr>
+          <a:xfrm>
+            <a:off x="628650" y="136524"/>
+            <a:ext cx="7886700" cy="1325563"/>
+          </a:xfrm>
+        </p:spPr>
+        <p:txBody>
+          <a:bodyPr/>
+          <a:lstStyle/>
+          <a:p>
+            <a:r>
+              <a:rPr lang="en-US" dirty="0"/>
+              <a:t>Numbers</a:t>
+            </a:r>
+          </a:p>
+        </p:txBody>
+      </p:sp>
+    </p:spTree>
+    <p:extLst>
+      <p:ext uri="{BB962C8B-B14F-4D97-AF65-F5344CB8AC3E}">
+        <p14:creationId xmlns:p14="http://schemas.microsoft.com/office/powerpoint/2010/main" val="2885705354"/>
+      </p:ext>
+    </p:extLst>
+  </p:cSld>
+  <p:clrMapOvr>
+    <a:masterClrMapping/>
+  </p:clrMapOvr>
+</p:sld>
+</file>
+
+<file path=ppt/slides/slide6.xml><?xml version="1.0" encoding="utf-8"?>
 <p:sld xmlns:a="http://schemas.openxmlformats.org/drawingml/2006/main" xmlns:r="http://schemas.openxmlformats.org/officeDocument/2006/relationships" xmlns:p="http://schemas.openxmlformats.org/presentationml/2006/main">
   <p:cSld>
     <p:spTree>

</xml_diff>

<commit_message>
added more to lecture 1
</commit_message>
<xml_diff>
--- a/01_introduction_to_python/slides.pptx
+++ b/01_introduction_to_python/slides.pptx
@@ -5,7 +5,7 @@
     <p:sldMasterId id="2147483660" r:id="rId1"/>
   </p:sldMasterIdLst>
   <p:notesMasterIdLst>
-    <p:notesMasterId r:id="rId8"/>
+    <p:notesMasterId r:id="rId11"/>
   </p:notesMasterIdLst>
   <p:sldIdLst>
     <p:sldId id="256" r:id="rId2"/>
@@ -14,6 +14,9 @@
     <p:sldId id="261" r:id="rId5"/>
     <p:sldId id="260" r:id="rId6"/>
     <p:sldId id="257" r:id="rId7"/>
+    <p:sldId id="262" r:id="rId8"/>
+    <p:sldId id="263" r:id="rId9"/>
+    <p:sldId id="264" r:id="rId10"/>
   </p:sldIdLst>
   <p:sldSz cx="9144000" cy="6858000" type="screen4x3"/>
   <p:notesSz cx="6858000" cy="9144000"/>
@@ -4239,19 +4242,7 @@
               <a:rPr lang="en-US" sz="2800" dirty="0">
                 <a:latin typeface="Helvetica Light" panose="020B0403020202020204" pitchFamily="34" charset="0"/>
               </a:rPr>
-              <a:t>Dictionary: {0 : 1, 1 : 2}, {“key” : </a:t>
-            </a:r>
-            <a:r>
-              <a:rPr lang="en-US" sz="2800">
-                <a:latin typeface="Helvetica Light" panose="020B0403020202020204" pitchFamily="34" charset="0"/>
-              </a:rPr>
-              <a:t>“value” </a:t>
-            </a:r>
-            <a:r>
-              <a:rPr lang="en-US" sz="2800" dirty="0">
-                <a:latin typeface="Helvetica Light" panose="020B0403020202020204" pitchFamily="34" charset="0"/>
-              </a:rPr>
-              <a:t>} </a:t>
+              <a:t>Dictionary: {0 : 1, 1 : 2}, {“key” : “value” } </a:t>
             </a:r>
           </a:p>
         </p:txBody>
@@ -4319,6 +4310,108 @@
           </a:p>
         </p:txBody>
       </p:sp>
+      <p:sp>
+        <p:nvSpPr>
+          <p:cNvPr id="6" name="TextBox 5">
+            <a:extLst>
+              <a:ext uri="{FF2B5EF4-FFF2-40B4-BE49-F238E27FC236}">
+                <a16:creationId xmlns:a16="http://schemas.microsoft.com/office/drawing/2014/main" id="{6A852C1C-9E82-B642-8419-E83EFE7DF4FE}"/>
+              </a:ext>
+            </a:extLst>
+          </p:cNvPr>
+          <p:cNvSpPr txBox="1"/>
+          <p:nvPr/>
+        </p:nvSpPr>
+        <p:spPr>
+          <a:xfrm>
+            <a:off x="378372" y="3429000"/>
+            <a:ext cx="8040414" cy="1815882"/>
+          </a:xfrm>
+          <a:prstGeom prst="rect">
+            <a:avLst/>
+          </a:prstGeom>
+          <a:noFill/>
+        </p:spPr>
+        <p:txBody>
+          <a:bodyPr wrap="square" rtlCol="0">
+            <a:spAutoFit/>
+          </a:bodyPr>
+          <a:lstStyle/>
+          <a:p>
+            <a:r>
+              <a:rPr lang="en-US" sz="2800" dirty="0">
+                <a:latin typeface="Courier New" panose="02070309020205020404" pitchFamily="49" charset="0"/>
+                <a:cs typeface="Courier New" panose="02070309020205020404" pitchFamily="49" charset="0"/>
+              </a:rPr>
+              <a:t># Number examples</a:t>
+            </a:r>
+          </a:p>
+          <a:p>
+            <a:r>
+              <a:rPr lang="en-US" sz="2800" dirty="0">
+                <a:latin typeface="Courier New" panose="02070309020205020404" pitchFamily="49" charset="0"/>
+                <a:cs typeface="Courier New" panose="02070309020205020404" pitchFamily="49" charset="0"/>
+              </a:rPr>
+              <a:t>num_1 = 1 # int</a:t>
+            </a:r>
+          </a:p>
+          <a:p>
+            <a:r>
+              <a:rPr lang="en-US" sz="2800" dirty="0">
+                <a:latin typeface="Courier New" panose="02070309020205020404" pitchFamily="49" charset="0"/>
+                <a:cs typeface="Courier New" panose="02070309020205020404" pitchFamily="49" charset="0"/>
+              </a:rPr>
+              <a:t>num_2 = 1.5 # float </a:t>
+            </a:r>
+          </a:p>
+          <a:p>
+            <a:r>
+              <a:rPr lang="en-US" sz="2800" dirty="0">
+                <a:latin typeface="Courier New" panose="02070309020205020404" pitchFamily="49" charset="0"/>
+                <a:cs typeface="Courier New" panose="02070309020205020404" pitchFamily="49" charset="0"/>
+              </a:rPr>
+              <a:t>num_3 = 1. # float </a:t>
+            </a:r>
+          </a:p>
+        </p:txBody>
+      </p:sp>
+      <p:sp>
+        <p:nvSpPr>
+          <p:cNvPr id="7" name="TextBox 6">
+            <a:extLst>
+              <a:ext uri="{FF2B5EF4-FFF2-40B4-BE49-F238E27FC236}">
+                <a16:creationId xmlns:a16="http://schemas.microsoft.com/office/drawing/2014/main" id="{1733FA67-FE21-0044-9ED0-67CA818BB571}"/>
+              </a:ext>
+            </a:extLst>
+          </p:cNvPr>
+          <p:cNvSpPr txBox="1"/>
+          <p:nvPr/>
+        </p:nvSpPr>
+        <p:spPr>
+          <a:xfrm>
+            <a:off x="378372" y="1462087"/>
+            <a:ext cx="8040414" cy="1815882"/>
+          </a:xfrm>
+          <a:prstGeom prst="rect">
+            <a:avLst/>
+          </a:prstGeom>
+          <a:noFill/>
+        </p:spPr>
+        <p:txBody>
+          <a:bodyPr wrap="square" rtlCol="0">
+            <a:spAutoFit/>
+          </a:bodyPr>
+          <a:lstStyle/>
+          <a:p>
+            <a:r>
+              <a:rPr lang="en-US" sz="2800" dirty="0">
+                <a:latin typeface="Helvetica Light" panose="020B0403020202020204" pitchFamily="34" charset="0"/>
+              </a:rPr>
+              <a:t>There are two types of numbers: int or integers, cannot store fractional values, and float or floating point numbers can store any number in a huge range. </a:t>
+            </a:r>
+          </a:p>
+        </p:txBody>
+      </p:sp>
     </p:spTree>
     <p:extLst>
       <p:ext uri="{BB962C8B-B14F-4D97-AF65-F5344CB8AC3E}">
@@ -4372,7 +4465,357 @@
           <a:p>
             <a:r>
               <a:rPr lang="en-US" dirty="0"/>
-              <a:t>Strings</a:t>
+              <a:t>Number Operations</a:t>
+            </a:r>
+          </a:p>
+        </p:txBody>
+      </p:sp>
+      <p:sp>
+        <p:nvSpPr>
+          <p:cNvPr id="4" name="TextBox 3">
+            <a:extLst>
+              <a:ext uri="{FF2B5EF4-FFF2-40B4-BE49-F238E27FC236}">
+                <a16:creationId xmlns:a16="http://schemas.microsoft.com/office/drawing/2014/main" id="{3220CE55-0EF8-E54D-ADA1-383749BCADB3}"/>
+              </a:ext>
+            </a:extLst>
+          </p:cNvPr>
+          <p:cNvSpPr txBox="1"/>
+          <p:nvPr/>
+        </p:nvSpPr>
+        <p:spPr>
+          <a:xfrm>
+            <a:off x="84082" y="1239173"/>
+            <a:ext cx="4414346" cy="3754874"/>
+          </a:xfrm>
+          <a:prstGeom prst="rect">
+            <a:avLst/>
+          </a:prstGeom>
+          <a:noFill/>
+        </p:spPr>
+        <p:txBody>
+          <a:bodyPr wrap="square" rtlCol="0">
+            <a:spAutoFit/>
+          </a:bodyPr>
+          <a:lstStyle/>
+          <a:p>
+            <a:r>
+              <a:rPr lang="en-US" sz="1400" dirty="0">
+                <a:latin typeface="Courier New" panose="02070309020205020404" pitchFamily="49" charset="0"/>
+                <a:cs typeface="Courier New" panose="02070309020205020404" pitchFamily="49" charset="0"/>
+              </a:rPr>
+              <a:t>&gt;&gt;&gt; 2 + 3 # int addition</a:t>
+            </a:r>
+          </a:p>
+          <a:p>
+            <a:r>
+              <a:rPr lang="en-US" sz="1400" dirty="0">
+                <a:latin typeface="Courier New" panose="02070309020205020404" pitchFamily="49" charset="0"/>
+                <a:cs typeface="Courier New" panose="02070309020205020404" pitchFamily="49" charset="0"/>
+              </a:rPr>
+              <a:t>5</a:t>
+            </a:r>
+          </a:p>
+          <a:p>
+            <a:endParaRPr lang="en-US" sz="1400" dirty="0">
+              <a:latin typeface="Courier New" panose="02070309020205020404" pitchFamily="49" charset="0"/>
+              <a:cs typeface="Courier New" panose="02070309020205020404" pitchFamily="49" charset="0"/>
+            </a:endParaRPr>
+          </a:p>
+          <a:p>
+            <a:r>
+              <a:rPr lang="en-US" sz="1400" dirty="0">
+                <a:latin typeface="Courier New" panose="02070309020205020404" pitchFamily="49" charset="0"/>
+                <a:cs typeface="Courier New" panose="02070309020205020404" pitchFamily="49" charset="0"/>
+              </a:rPr>
+              <a:t>&gt;&gt;&gt; 2. + 3. # float addition</a:t>
+            </a:r>
+          </a:p>
+          <a:p>
+            <a:r>
+              <a:rPr lang="en-US" sz="1400" dirty="0">
+                <a:latin typeface="Courier New" panose="02070309020205020404" pitchFamily="49" charset="0"/>
+                <a:cs typeface="Courier New" panose="02070309020205020404" pitchFamily="49" charset="0"/>
+              </a:rPr>
+              <a:t>5.0</a:t>
+            </a:r>
+          </a:p>
+          <a:p>
+            <a:endParaRPr lang="en-US" sz="1400" dirty="0">
+              <a:latin typeface="Courier New" panose="02070309020205020404" pitchFamily="49" charset="0"/>
+              <a:cs typeface="Courier New" panose="02070309020205020404" pitchFamily="49" charset="0"/>
+            </a:endParaRPr>
+          </a:p>
+          <a:p>
+            <a:r>
+              <a:rPr lang="en-US" sz="1400" dirty="0">
+                <a:latin typeface="Courier New" panose="02070309020205020404" pitchFamily="49" charset="0"/>
+                <a:cs typeface="Courier New" panose="02070309020205020404" pitchFamily="49" charset="0"/>
+              </a:rPr>
+              <a:t>&gt;&gt;&gt; 2. + 3 # still float addition since </a:t>
+            </a:r>
+          </a:p>
+          <a:p>
+            <a:r>
+              <a:rPr lang="en-US" sz="1400" dirty="0">
+                <a:latin typeface="Courier New" panose="02070309020205020404" pitchFamily="49" charset="0"/>
+                <a:cs typeface="Courier New" panose="02070309020205020404" pitchFamily="49" charset="0"/>
+              </a:rPr>
+              <a:t>one of the two number is a float</a:t>
+            </a:r>
+          </a:p>
+          <a:p>
+            <a:r>
+              <a:rPr lang="en-US" sz="1400" dirty="0">
+                <a:latin typeface="Courier New" panose="02070309020205020404" pitchFamily="49" charset="0"/>
+                <a:cs typeface="Courier New" panose="02070309020205020404" pitchFamily="49" charset="0"/>
+              </a:rPr>
+              <a:t>5.0</a:t>
+            </a:r>
+          </a:p>
+          <a:p>
+            <a:endParaRPr lang="en-US" sz="1400" dirty="0">
+              <a:latin typeface="Courier New" panose="02070309020205020404" pitchFamily="49" charset="0"/>
+              <a:cs typeface="Courier New" panose="02070309020205020404" pitchFamily="49" charset="0"/>
+            </a:endParaRPr>
+          </a:p>
+          <a:p>
+            <a:r>
+              <a:rPr lang="en-US" sz="1400" dirty="0">
+                <a:latin typeface="Courier New" panose="02070309020205020404" pitchFamily="49" charset="0"/>
+                <a:cs typeface="Courier New" panose="02070309020205020404" pitchFamily="49" charset="0"/>
+              </a:rPr>
+              <a:t>&gt;&gt;&gt; 5 / 2 # int division, there can be no fractional values in int, thus is rounded down </a:t>
+            </a:r>
+          </a:p>
+          <a:p>
+            <a:r>
+              <a:rPr lang="en-US" sz="1400" dirty="0">
+                <a:latin typeface="Courier New" panose="02070309020205020404" pitchFamily="49" charset="0"/>
+                <a:cs typeface="Courier New" panose="02070309020205020404" pitchFamily="49" charset="0"/>
+              </a:rPr>
+              <a:t>2 </a:t>
+            </a:r>
+          </a:p>
+          <a:p>
+            <a:endParaRPr lang="en-US" sz="1400" dirty="0">
+              <a:latin typeface="Courier New" panose="02070309020205020404" pitchFamily="49" charset="0"/>
+              <a:cs typeface="Courier New" panose="02070309020205020404" pitchFamily="49" charset="0"/>
+            </a:endParaRPr>
+          </a:p>
+          <a:p>
+            <a:r>
+              <a:rPr lang="en-US" sz="1400" dirty="0">
+                <a:latin typeface="Courier New" panose="02070309020205020404" pitchFamily="49" charset="0"/>
+                <a:cs typeface="Courier New" panose="02070309020205020404" pitchFamily="49" charset="0"/>
+              </a:rPr>
+              <a:t>&gt;&gt;&gt; 5. / 2. # float division </a:t>
+            </a:r>
+          </a:p>
+          <a:p>
+            <a:r>
+              <a:rPr lang="en-US" sz="1400" dirty="0">
+                <a:latin typeface="Courier New" panose="02070309020205020404" pitchFamily="49" charset="0"/>
+                <a:cs typeface="Courier New" panose="02070309020205020404" pitchFamily="49" charset="0"/>
+              </a:rPr>
+              <a:t>2.5 </a:t>
+            </a:r>
+          </a:p>
+        </p:txBody>
+      </p:sp>
+      <p:sp>
+        <p:nvSpPr>
+          <p:cNvPr id="5" name="TextBox 4">
+            <a:extLst>
+              <a:ext uri="{FF2B5EF4-FFF2-40B4-BE49-F238E27FC236}">
+                <a16:creationId xmlns:a16="http://schemas.microsoft.com/office/drawing/2014/main" id="{DE0F4AE6-A1A5-FD47-B4A2-0D0203772C9C}"/>
+              </a:ext>
+            </a:extLst>
+          </p:cNvPr>
+          <p:cNvSpPr txBox="1"/>
+          <p:nvPr/>
+        </p:nvSpPr>
+        <p:spPr>
+          <a:xfrm>
+            <a:off x="84082" y="5242034"/>
+            <a:ext cx="8686801" cy="923330"/>
+          </a:xfrm>
+          <a:prstGeom prst="rect">
+            <a:avLst/>
+          </a:prstGeom>
+          <a:noFill/>
+        </p:spPr>
+        <p:txBody>
+          <a:bodyPr wrap="square" rtlCol="0">
+            <a:spAutoFit/>
+          </a:bodyPr>
+          <a:lstStyle/>
+          <a:p>
+            <a:r>
+              <a:rPr lang="en-US" dirty="0">
+                <a:latin typeface="Courier New" panose="02070309020205020404" pitchFamily="49" charset="0"/>
+                <a:cs typeface="Courier New" panose="02070309020205020404" pitchFamily="49" charset="0"/>
+              </a:rPr>
+              <a:t>All operations: +, -, *, /, //, %, &gt;, &lt;, ==, !=, &gt;=, &lt;=, *=, +=, -=, /= </a:t>
+            </a:r>
+          </a:p>
+          <a:p>
+            <a:r>
+              <a:rPr lang="en-US" dirty="0">
+                <a:latin typeface="Courier New" panose="02070309020205020404" pitchFamily="49" charset="0"/>
+                <a:cs typeface="Courier New" panose="02070309020205020404" pitchFamily="49" charset="0"/>
+              </a:rPr>
+              <a:t>Take 5 mins to try some operations, are there any surprises?</a:t>
+            </a:r>
+          </a:p>
+        </p:txBody>
+      </p:sp>
+      <p:sp>
+        <p:nvSpPr>
+          <p:cNvPr id="6" name="TextBox 5">
+            <a:extLst>
+              <a:ext uri="{FF2B5EF4-FFF2-40B4-BE49-F238E27FC236}">
+                <a16:creationId xmlns:a16="http://schemas.microsoft.com/office/drawing/2014/main" id="{2BC70847-7038-7B40-88E9-508A0A4BD85D}"/>
+              </a:ext>
+            </a:extLst>
+          </p:cNvPr>
+          <p:cNvSpPr txBox="1"/>
+          <p:nvPr/>
+        </p:nvSpPr>
+        <p:spPr>
+          <a:xfrm>
+            <a:off x="4729654" y="1259148"/>
+            <a:ext cx="4414346" cy="3323987"/>
+          </a:xfrm>
+          <a:prstGeom prst="rect">
+            <a:avLst/>
+          </a:prstGeom>
+          <a:noFill/>
+        </p:spPr>
+        <p:txBody>
+          <a:bodyPr wrap="square" rtlCol="0">
+            <a:spAutoFit/>
+          </a:bodyPr>
+          <a:lstStyle/>
+          <a:p>
+            <a:r>
+              <a:rPr lang="en-US" sz="1400" dirty="0">
+                <a:latin typeface="Courier New" panose="02070309020205020404" pitchFamily="49" charset="0"/>
+                <a:cs typeface="Courier New" panose="02070309020205020404" pitchFamily="49" charset="0"/>
+              </a:rPr>
+              <a:t>&gt;&gt;&gt;1 == 1 # with </a:t>
+            </a:r>
+            <a:r>
+              <a:rPr lang="en-US" sz="1400" dirty="0" err="1">
+                <a:latin typeface="Courier New" panose="02070309020205020404" pitchFamily="49" charset="0"/>
+                <a:cs typeface="Courier New" panose="02070309020205020404" pitchFamily="49" charset="0"/>
+              </a:rPr>
+              <a:t>ints</a:t>
+            </a:r>
+            <a:r>
+              <a:rPr lang="en-US" sz="1400" dirty="0">
+                <a:latin typeface="Courier New" panose="02070309020205020404" pitchFamily="49" charset="0"/>
+                <a:cs typeface="Courier New" panose="02070309020205020404" pitchFamily="49" charset="0"/>
+              </a:rPr>
+              <a:t> it is always possible to check to see if they are same value with "==" operator </a:t>
+            </a:r>
+          </a:p>
+          <a:p>
+            <a:r>
+              <a:rPr lang="en-US" sz="1400" dirty="0">
+                <a:latin typeface="Courier New" panose="02070309020205020404" pitchFamily="49" charset="0"/>
+                <a:cs typeface="Courier New" panose="02070309020205020404" pitchFamily="49" charset="0"/>
+              </a:rPr>
+              <a:t>True</a:t>
+            </a:r>
+          </a:p>
+          <a:p>
+            <a:endParaRPr lang="en-US" sz="1400" dirty="0">
+              <a:latin typeface="Courier New" panose="02070309020205020404" pitchFamily="49" charset="0"/>
+              <a:cs typeface="Courier New" panose="02070309020205020404" pitchFamily="49" charset="0"/>
+            </a:endParaRPr>
+          </a:p>
+          <a:p>
+            <a:r>
+              <a:rPr lang="en-US" sz="1400" dirty="0">
+                <a:latin typeface="Courier New" panose="02070309020205020404" pitchFamily="49" charset="0"/>
+                <a:cs typeface="Courier New" panose="02070309020205020404" pitchFamily="49" charset="0"/>
+              </a:rPr>
+              <a:t>&gt;&gt;&gt;1 &gt; 2</a:t>
+            </a:r>
+          </a:p>
+          <a:p>
+            <a:r>
+              <a:rPr lang="en-US" sz="1400" dirty="0">
+                <a:latin typeface="Courier New" panose="02070309020205020404" pitchFamily="49" charset="0"/>
+                <a:cs typeface="Courier New" panose="02070309020205020404" pitchFamily="49" charset="0"/>
+              </a:rPr>
+              <a:t>False</a:t>
+            </a:r>
+          </a:p>
+          <a:p>
+            <a:endParaRPr lang="en-US" sz="1400" dirty="0">
+              <a:latin typeface="Courier New" panose="02070309020205020404" pitchFamily="49" charset="0"/>
+              <a:cs typeface="Courier New" panose="02070309020205020404" pitchFamily="49" charset="0"/>
+            </a:endParaRPr>
+          </a:p>
+          <a:p>
+            <a:r>
+              <a:rPr lang="en-US" sz="1400" dirty="0">
+                <a:latin typeface="Courier New" panose="02070309020205020404" pitchFamily="49" charset="0"/>
+                <a:cs typeface="Courier New" panose="02070309020205020404" pitchFamily="49" charset="0"/>
+              </a:rPr>
+              <a:t>&gt;&gt;&gt;2 &gt;= 2 # greater or equal </a:t>
+            </a:r>
+          </a:p>
+          <a:p>
+            <a:r>
+              <a:rPr lang="en-US" sz="1400" dirty="0">
+                <a:latin typeface="Courier New" panose="02070309020205020404" pitchFamily="49" charset="0"/>
+                <a:cs typeface="Courier New" panose="02070309020205020404" pitchFamily="49" charset="0"/>
+              </a:rPr>
+              <a:t>True</a:t>
+            </a:r>
+          </a:p>
+          <a:p>
+            <a:endParaRPr lang="en-US" sz="1400" dirty="0">
+              <a:latin typeface="Courier New" panose="02070309020205020404" pitchFamily="49" charset="0"/>
+              <a:cs typeface="Courier New" panose="02070309020205020404" pitchFamily="49" charset="0"/>
+            </a:endParaRPr>
+          </a:p>
+          <a:p>
+            <a:r>
+              <a:rPr lang="en-US" sz="1400" dirty="0">
+                <a:latin typeface="Courier New" panose="02070309020205020404" pitchFamily="49" charset="0"/>
+                <a:cs typeface="Courier New" panose="02070309020205020404" pitchFamily="49" charset="0"/>
+              </a:rPr>
+              <a:t>&gt;&gt;&gt;a = 5 </a:t>
+            </a:r>
+          </a:p>
+          <a:p>
+            <a:r>
+              <a:rPr lang="en-US" sz="1400" dirty="0">
+                <a:latin typeface="Courier New" panose="02070309020205020404" pitchFamily="49" charset="0"/>
+                <a:cs typeface="Courier New" panose="02070309020205020404" pitchFamily="49" charset="0"/>
+              </a:rPr>
+              <a:t>&gt;&gt;&gt;a += 5 # same as a = a + 5</a:t>
+            </a:r>
+          </a:p>
+          <a:p>
+            <a:r>
+              <a:rPr lang="en-US" sz="1400" dirty="0">
+                <a:latin typeface="Courier New" panose="02070309020205020404" pitchFamily="49" charset="0"/>
+                <a:cs typeface="Courier New" panose="02070309020205020404" pitchFamily="49" charset="0"/>
+              </a:rPr>
+              <a:t>&gt;&gt;&gt;print(a)</a:t>
+            </a:r>
+          </a:p>
+          <a:p>
+            <a:r>
+              <a:rPr lang="en-US" sz="1400" dirty="0">
+                <a:latin typeface="Courier New" panose="02070309020205020404" pitchFamily="49" charset="0"/>
+                <a:cs typeface="Courier New" panose="02070309020205020404" pitchFamily="49" charset="0"/>
+              </a:rPr>
+              <a:t>10</a:t>
             </a:r>
           </a:p>
         </p:txBody>
@@ -4381,6 +4824,859 @@
     <p:extLst>
       <p:ext uri="{BB962C8B-B14F-4D97-AF65-F5344CB8AC3E}">
         <p14:creationId xmlns:p14="http://schemas.microsoft.com/office/powerpoint/2010/main" val="4164762645"/>
+      </p:ext>
+    </p:extLst>
+  </p:cSld>
+  <p:clrMapOvr>
+    <a:masterClrMapping/>
+  </p:clrMapOvr>
+</p:sld>
+</file>
+
+<file path=ppt/slides/slide7.xml><?xml version="1.0" encoding="utf-8"?>
+<p:sld xmlns:a="http://schemas.openxmlformats.org/drawingml/2006/main" xmlns:r="http://schemas.openxmlformats.org/officeDocument/2006/relationships" xmlns:p="http://schemas.openxmlformats.org/presentationml/2006/main">
+  <p:cSld>
+    <p:spTree>
+      <p:nvGrpSpPr>
+        <p:cNvPr id="1" name=""/>
+        <p:cNvGrpSpPr/>
+        <p:nvPr/>
+      </p:nvGrpSpPr>
+      <p:grpSpPr>
+        <a:xfrm>
+          <a:off x="0" y="0"/>
+          <a:ext cx="0" cy="0"/>
+          <a:chOff x="0" y="0"/>
+          <a:chExt cx="0" cy="0"/>
+        </a:xfrm>
+      </p:grpSpPr>
+      <p:sp>
+        <p:nvSpPr>
+          <p:cNvPr id="2" name="Title 1">
+            <a:extLst>
+              <a:ext uri="{FF2B5EF4-FFF2-40B4-BE49-F238E27FC236}">
+                <a16:creationId xmlns:a16="http://schemas.microsoft.com/office/drawing/2014/main" id="{F889A6B4-ABC8-164D-A645-842681269F09}"/>
+              </a:ext>
+            </a:extLst>
+          </p:cNvPr>
+          <p:cNvSpPr>
+            <a:spLocks noGrp="1"/>
+          </p:cNvSpPr>
+          <p:nvPr>
+            <p:ph type="title"/>
+          </p:nvPr>
+        </p:nvSpPr>
+        <p:spPr/>
+        <p:txBody>
+          <a:bodyPr/>
+          <a:lstStyle/>
+          <a:p>
+            <a:r>
+              <a:rPr lang="en-US" dirty="0"/>
+              <a:t>Strings</a:t>
+            </a:r>
+          </a:p>
+        </p:txBody>
+      </p:sp>
+      <p:sp>
+        <p:nvSpPr>
+          <p:cNvPr id="3" name="TextBox 2">
+            <a:extLst>
+              <a:ext uri="{FF2B5EF4-FFF2-40B4-BE49-F238E27FC236}">
+                <a16:creationId xmlns:a16="http://schemas.microsoft.com/office/drawing/2014/main" id="{6D3B0E03-0AE4-244E-971F-8A8306CFA7E3}"/>
+              </a:ext>
+            </a:extLst>
+          </p:cNvPr>
+          <p:cNvSpPr txBox="1"/>
+          <p:nvPr/>
+        </p:nvSpPr>
+        <p:spPr>
+          <a:xfrm>
+            <a:off x="378372" y="2167758"/>
+            <a:ext cx="8040414" cy="3539430"/>
+          </a:xfrm>
+          <a:prstGeom prst="rect">
+            <a:avLst/>
+          </a:prstGeom>
+          <a:noFill/>
+        </p:spPr>
+        <p:txBody>
+          <a:bodyPr wrap="square" rtlCol="0">
+            <a:spAutoFit/>
+          </a:bodyPr>
+          <a:lstStyle/>
+          <a:p>
+            <a:r>
+              <a:rPr lang="en-US" sz="2800" dirty="0">
+                <a:latin typeface="Courier New" panose="02070309020205020404" pitchFamily="49" charset="0"/>
+                <a:cs typeface="Courier New" panose="02070309020205020404" pitchFamily="49" charset="0"/>
+              </a:rPr>
+              <a:t># can use 'single quotes' or "double quotes" or """triple quotes"""</a:t>
+            </a:r>
+          </a:p>
+          <a:p>
+            <a:r>
+              <a:rPr lang="en-US" sz="2800" dirty="0">
+                <a:latin typeface="Courier New" panose="02070309020205020404" pitchFamily="49" charset="0"/>
+                <a:cs typeface="Courier New" panose="02070309020205020404" pitchFamily="49" charset="0"/>
+              </a:rPr>
+              <a:t># triple quotes and span multiple lines</a:t>
+            </a:r>
+          </a:p>
+          <a:p>
+            <a:r>
+              <a:rPr lang="en-US" sz="2800" dirty="0">
+                <a:latin typeface="Courier New" panose="02070309020205020404" pitchFamily="49" charset="0"/>
+                <a:cs typeface="Courier New" panose="02070309020205020404" pitchFamily="49" charset="0"/>
+              </a:rPr>
+              <a:t>str_1 = "Hello World"</a:t>
+            </a:r>
+          </a:p>
+          <a:p>
+            <a:r>
+              <a:rPr lang="en-US" sz="2800" dirty="0">
+                <a:latin typeface="Courier New" panose="02070309020205020404" pitchFamily="49" charset="0"/>
+                <a:cs typeface="Courier New" panose="02070309020205020404" pitchFamily="49" charset="0"/>
+              </a:rPr>
+              <a:t>str_2 = '100'</a:t>
+            </a:r>
+          </a:p>
+          <a:p>
+            <a:r>
+              <a:rPr lang="en-US" sz="2800" dirty="0">
+                <a:latin typeface="Courier New" panose="02070309020205020404" pitchFamily="49" charset="0"/>
+                <a:cs typeface="Courier New" panose="02070309020205020404" pitchFamily="49" charset="0"/>
+              </a:rPr>
+              <a:t>str_3 = """</a:t>
+            </a:r>
+            <a:r>
+              <a:rPr lang="en-US" sz="2800" dirty="0" err="1">
+                <a:latin typeface="Courier New" panose="02070309020205020404" pitchFamily="49" charset="0"/>
+                <a:cs typeface="Courier New" panose="02070309020205020404" pitchFamily="49" charset="0"/>
+              </a:rPr>
+              <a:t>sdgwerg</a:t>
+            </a:r>
+            <a:r>
+              <a:rPr lang="en-US" sz="2800" dirty="0">
+                <a:latin typeface="Courier New" panose="02070309020205020404" pitchFamily="49" charset="0"/>
+                <a:cs typeface="Courier New" panose="02070309020205020404" pitchFamily="49" charset="0"/>
+              </a:rPr>
+              <a:t>@#$@</a:t>
+            </a:r>
+          </a:p>
+          <a:p>
+            <a:r>
+              <a:rPr lang="en-US" sz="2800" dirty="0">
+                <a:latin typeface="Courier New" panose="02070309020205020404" pitchFamily="49" charset="0"/>
+                <a:cs typeface="Courier New" panose="02070309020205020404" pitchFamily="49" charset="0"/>
+              </a:rPr>
+              <a:t>			 #$%343 """</a:t>
+            </a:r>
+          </a:p>
+        </p:txBody>
+      </p:sp>
+      <p:sp>
+        <p:nvSpPr>
+          <p:cNvPr id="4" name="TextBox 3">
+            <a:extLst>
+              <a:ext uri="{FF2B5EF4-FFF2-40B4-BE49-F238E27FC236}">
+                <a16:creationId xmlns:a16="http://schemas.microsoft.com/office/drawing/2014/main" id="{46248A77-B36C-D941-99FE-A27742D1BAD3}"/>
+              </a:ext>
+            </a:extLst>
+          </p:cNvPr>
+          <p:cNvSpPr txBox="1"/>
+          <p:nvPr/>
+        </p:nvSpPr>
+        <p:spPr>
+          <a:xfrm>
+            <a:off x="378372" y="1462087"/>
+            <a:ext cx="8040414" cy="523220"/>
+          </a:xfrm>
+          <a:prstGeom prst="rect">
+            <a:avLst/>
+          </a:prstGeom>
+          <a:noFill/>
+        </p:spPr>
+        <p:txBody>
+          <a:bodyPr wrap="square" rtlCol="0">
+            <a:spAutoFit/>
+          </a:bodyPr>
+          <a:lstStyle/>
+          <a:p>
+            <a:r>
+              <a:rPr lang="en-US" sz="2800" dirty="0">
+                <a:latin typeface="Helvetica Light" panose="020B0403020202020204" pitchFamily="34" charset="0"/>
+              </a:rPr>
+              <a:t>Strings store text or any series of characters</a:t>
+            </a:r>
+          </a:p>
+        </p:txBody>
+      </p:sp>
+    </p:spTree>
+    <p:extLst>
+      <p:ext uri="{BB962C8B-B14F-4D97-AF65-F5344CB8AC3E}">
+        <p14:creationId xmlns:p14="http://schemas.microsoft.com/office/powerpoint/2010/main" val="437396110"/>
+      </p:ext>
+    </p:extLst>
+  </p:cSld>
+  <p:clrMapOvr>
+    <a:masterClrMapping/>
+  </p:clrMapOvr>
+</p:sld>
+</file>
+
+<file path=ppt/slides/slide8.xml><?xml version="1.0" encoding="utf-8"?>
+<p:sld xmlns:a="http://schemas.openxmlformats.org/drawingml/2006/main" xmlns:r="http://schemas.openxmlformats.org/officeDocument/2006/relationships" xmlns:p="http://schemas.openxmlformats.org/presentationml/2006/main">
+  <p:cSld>
+    <p:spTree>
+      <p:nvGrpSpPr>
+        <p:cNvPr id="1" name=""/>
+        <p:cNvGrpSpPr/>
+        <p:nvPr/>
+      </p:nvGrpSpPr>
+      <p:grpSpPr>
+        <a:xfrm>
+          <a:off x="0" y="0"/>
+          <a:ext cx="0" cy="0"/>
+          <a:chOff x="0" y="0"/>
+          <a:chExt cx="0" cy="0"/>
+        </a:xfrm>
+      </p:grpSpPr>
+      <p:sp>
+        <p:nvSpPr>
+          <p:cNvPr id="2" name="Title 1">
+            <a:extLst>
+              <a:ext uri="{FF2B5EF4-FFF2-40B4-BE49-F238E27FC236}">
+                <a16:creationId xmlns:a16="http://schemas.microsoft.com/office/drawing/2014/main" id="{F889A6B4-ABC8-164D-A645-842681269F09}"/>
+              </a:ext>
+            </a:extLst>
+          </p:cNvPr>
+          <p:cNvSpPr>
+            <a:spLocks noGrp="1"/>
+          </p:cNvSpPr>
+          <p:nvPr>
+            <p:ph type="title"/>
+          </p:nvPr>
+        </p:nvSpPr>
+        <p:spPr/>
+        <p:txBody>
+          <a:bodyPr/>
+          <a:lstStyle/>
+          <a:p>
+            <a:r>
+              <a:rPr lang="en-US" dirty="0"/>
+              <a:t>String Operations</a:t>
+            </a:r>
+          </a:p>
+        </p:txBody>
+      </p:sp>
+      <p:sp>
+        <p:nvSpPr>
+          <p:cNvPr id="4" name="TextBox 3">
+            <a:extLst>
+              <a:ext uri="{FF2B5EF4-FFF2-40B4-BE49-F238E27FC236}">
+                <a16:creationId xmlns:a16="http://schemas.microsoft.com/office/drawing/2014/main" id="{3220CE55-0EF8-E54D-ADA1-383749BCADB3}"/>
+              </a:ext>
+            </a:extLst>
+          </p:cNvPr>
+          <p:cNvSpPr txBox="1"/>
+          <p:nvPr/>
+        </p:nvSpPr>
+        <p:spPr>
+          <a:xfrm>
+            <a:off x="84082" y="1239173"/>
+            <a:ext cx="4414346" cy="3970318"/>
+          </a:xfrm>
+          <a:prstGeom prst="rect">
+            <a:avLst/>
+          </a:prstGeom>
+          <a:noFill/>
+        </p:spPr>
+        <p:txBody>
+          <a:bodyPr wrap="square" rtlCol="0">
+            <a:spAutoFit/>
+          </a:bodyPr>
+          <a:lstStyle/>
+          <a:p>
+            <a:r>
+              <a:rPr lang="en-US" sz="1400" dirty="0">
+                <a:latin typeface="Courier New" panose="02070309020205020404" pitchFamily="49" charset="0"/>
+                <a:cs typeface="Courier New" panose="02070309020205020404" pitchFamily="49" charset="0"/>
+              </a:rPr>
+              <a:t>&gt;&gt;&gt;"hello" + "world" # concatenation or string addition</a:t>
+            </a:r>
+          </a:p>
+          <a:p>
+            <a:r>
+              <a:rPr lang="en-US" sz="1400" dirty="0">
+                <a:latin typeface="Courier New" panose="02070309020205020404" pitchFamily="49" charset="0"/>
+                <a:cs typeface="Courier New" panose="02070309020205020404" pitchFamily="49" charset="0"/>
+              </a:rPr>
+              <a:t>'</a:t>
+            </a:r>
+            <a:r>
+              <a:rPr lang="en-US" sz="1400" dirty="0" err="1">
+                <a:latin typeface="Courier New" panose="02070309020205020404" pitchFamily="49" charset="0"/>
+                <a:cs typeface="Courier New" panose="02070309020205020404" pitchFamily="49" charset="0"/>
+              </a:rPr>
+              <a:t>helloworld</a:t>
+            </a:r>
+            <a:r>
+              <a:rPr lang="en-US" sz="1400" dirty="0">
+                <a:latin typeface="Courier New" panose="02070309020205020404" pitchFamily="49" charset="0"/>
+                <a:cs typeface="Courier New" panose="02070309020205020404" pitchFamily="49" charset="0"/>
+              </a:rPr>
+              <a:t>'</a:t>
+            </a:r>
+          </a:p>
+          <a:p>
+            <a:endParaRPr lang="en-US" sz="1400" dirty="0">
+              <a:latin typeface="Courier New" panose="02070309020205020404" pitchFamily="49" charset="0"/>
+              <a:cs typeface="Courier New" panose="02070309020205020404" pitchFamily="49" charset="0"/>
+            </a:endParaRPr>
+          </a:p>
+          <a:p>
+            <a:r>
+              <a:rPr lang="en-US" sz="1400" dirty="0">
+                <a:latin typeface="Courier New" panose="02070309020205020404" pitchFamily="49" charset="0"/>
+                <a:cs typeface="Courier New" panose="02070309020205020404" pitchFamily="49" charset="0"/>
+              </a:rPr>
+              <a:t>&gt;&gt;&gt;"hello"*3 # repetition or string multiplication</a:t>
+            </a:r>
+          </a:p>
+          <a:p>
+            <a:r>
+              <a:rPr lang="en-US" sz="1400" dirty="0">
+                <a:latin typeface="Courier New" panose="02070309020205020404" pitchFamily="49" charset="0"/>
+                <a:cs typeface="Courier New" panose="02070309020205020404" pitchFamily="49" charset="0"/>
+              </a:rPr>
+              <a:t>'</a:t>
+            </a:r>
+            <a:r>
+              <a:rPr lang="en-US" sz="1400" dirty="0" err="1">
+                <a:latin typeface="Courier New" panose="02070309020205020404" pitchFamily="49" charset="0"/>
+                <a:cs typeface="Courier New" panose="02070309020205020404" pitchFamily="49" charset="0"/>
+              </a:rPr>
+              <a:t>hellohellohello</a:t>
+            </a:r>
+            <a:r>
+              <a:rPr lang="en-US" sz="1400" dirty="0">
+                <a:latin typeface="Courier New" panose="02070309020205020404" pitchFamily="49" charset="0"/>
+                <a:cs typeface="Courier New" panose="02070309020205020404" pitchFamily="49" charset="0"/>
+              </a:rPr>
+              <a:t>'</a:t>
+            </a:r>
+          </a:p>
+          <a:p>
+            <a:endParaRPr lang="en-US" sz="1400" dirty="0">
+              <a:latin typeface="Courier New" panose="02070309020205020404" pitchFamily="49" charset="0"/>
+              <a:cs typeface="Courier New" panose="02070309020205020404" pitchFamily="49" charset="0"/>
+            </a:endParaRPr>
+          </a:p>
+          <a:p>
+            <a:r>
+              <a:rPr lang="en-US" sz="1400" dirty="0">
+                <a:latin typeface="Courier New" panose="02070309020205020404" pitchFamily="49" charset="0"/>
+                <a:cs typeface="Courier New" panose="02070309020205020404" pitchFamily="49" charset="0"/>
+              </a:rPr>
+              <a:t>&gt;&gt;&gt;"hello"[0] # indexing, getting a specific character </a:t>
+            </a:r>
+          </a:p>
+          <a:p>
+            <a:r>
+              <a:rPr lang="en-US" sz="1400" dirty="0">
+                <a:latin typeface="Courier New" panose="02070309020205020404" pitchFamily="49" charset="0"/>
+                <a:cs typeface="Courier New" panose="02070309020205020404" pitchFamily="49" charset="0"/>
+              </a:rPr>
+              <a:t>'h'</a:t>
+            </a:r>
+          </a:p>
+          <a:p>
+            <a:endParaRPr lang="en-US" sz="1400" dirty="0">
+              <a:latin typeface="Courier New" panose="02070309020205020404" pitchFamily="49" charset="0"/>
+              <a:cs typeface="Courier New" panose="02070309020205020404" pitchFamily="49" charset="0"/>
+            </a:endParaRPr>
+          </a:p>
+          <a:p>
+            <a:r>
+              <a:rPr lang="en-US" sz="1400" dirty="0">
+                <a:latin typeface="Courier New" panose="02070309020205020404" pitchFamily="49" charset="0"/>
+                <a:cs typeface="Courier New" panose="02070309020205020404" pitchFamily="49" charset="0"/>
+              </a:rPr>
+              <a:t>&gt;&gt;&gt;"hello"[-1] # indexing from the end</a:t>
+            </a:r>
+          </a:p>
+          <a:p>
+            <a:r>
+              <a:rPr lang="en-US" sz="1400" dirty="0">
+                <a:latin typeface="Courier New" panose="02070309020205020404" pitchFamily="49" charset="0"/>
+                <a:cs typeface="Courier New" panose="02070309020205020404" pitchFamily="49" charset="0"/>
+              </a:rPr>
+              <a:t>‘o’</a:t>
+            </a:r>
+          </a:p>
+          <a:p>
+            <a:endParaRPr lang="en-US" sz="1400" dirty="0">
+              <a:latin typeface="Courier New" panose="02070309020205020404" pitchFamily="49" charset="0"/>
+              <a:cs typeface="Courier New" panose="02070309020205020404" pitchFamily="49" charset="0"/>
+            </a:endParaRPr>
+          </a:p>
+          <a:p>
+            <a:r>
+              <a:rPr lang="en-US" sz="1400" dirty="0">
+                <a:latin typeface="Courier New" panose="02070309020205020404" pitchFamily="49" charset="0"/>
+                <a:cs typeface="Courier New" panose="02070309020205020404" pitchFamily="49" charset="0"/>
+              </a:rPr>
+              <a:t>&gt;&gt;&gt;</a:t>
+            </a:r>
+            <a:r>
+              <a:rPr lang="en-US" sz="1400" dirty="0" err="1">
+                <a:latin typeface="Courier New" panose="02070309020205020404" pitchFamily="49" charset="0"/>
+                <a:cs typeface="Courier New" panose="02070309020205020404" pitchFamily="49" charset="0"/>
+              </a:rPr>
+              <a:t>len</a:t>
+            </a:r>
+            <a:r>
+              <a:rPr lang="en-US" sz="1400" dirty="0">
+                <a:latin typeface="Courier New" panose="02070309020205020404" pitchFamily="49" charset="0"/>
+                <a:cs typeface="Courier New" panose="02070309020205020404" pitchFamily="49" charset="0"/>
+              </a:rPr>
+              <a:t>("hello") # get the length or size </a:t>
+            </a:r>
+          </a:p>
+          <a:p>
+            <a:r>
+              <a:rPr lang="en-US" sz="1400" dirty="0">
+                <a:latin typeface="Courier New" panose="02070309020205020404" pitchFamily="49" charset="0"/>
+                <a:cs typeface="Courier New" panose="02070309020205020404" pitchFamily="49" charset="0"/>
+              </a:rPr>
+              <a:t>5</a:t>
+            </a:r>
+          </a:p>
+        </p:txBody>
+      </p:sp>
+      <p:sp>
+        <p:nvSpPr>
+          <p:cNvPr id="5" name="TextBox 4">
+            <a:extLst>
+              <a:ext uri="{FF2B5EF4-FFF2-40B4-BE49-F238E27FC236}">
+                <a16:creationId xmlns:a16="http://schemas.microsoft.com/office/drawing/2014/main" id="{DE0F4AE6-A1A5-FD47-B4A2-0D0203772C9C}"/>
+              </a:ext>
+            </a:extLst>
+          </p:cNvPr>
+          <p:cNvSpPr txBox="1"/>
+          <p:nvPr/>
+        </p:nvSpPr>
+        <p:spPr>
+          <a:xfrm>
+            <a:off x="84082" y="5242034"/>
+            <a:ext cx="8686801" cy="923330"/>
+          </a:xfrm>
+          <a:prstGeom prst="rect">
+            <a:avLst/>
+          </a:prstGeom>
+          <a:noFill/>
+        </p:spPr>
+        <p:txBody>
+          <a:bodyPr wrap="square" rtlCol="0">
+            <a:spAutoFit/>
+          </a:bodyPr>
+          <a:lstStyle/>
+          <a:p>
+            <a:r>
+              <a:rPr lang="en-US" dirty="0">
+                <a:latin typeface="Courier New" panose="02070309020205020404" pitchFamily="49" charset="0"/>
+                <a:cs typeface="Courier New" panose="02070309020205020404" pitchFamily="49" charset="0"/>
+              </a:rPr>
+              <a:t>All operations: +, *, &gt;, &lt;, ==, !=, &gt;=, &lt;=, *=, +=</a:t>
+            </a:r>
+          </a:p>
+          <a:p>
+            <a:r>
+              <a:rPr lang="en-US" dirty="0">
+                <a:latin typeface="Courier New" panose="02070309020205020404" pitchFamily="49" charset="0"/>
+                <a:cs typeface="Courier New" panose="02070309020205020404" pitchFamily="49" charset="0"/>
+              </a:rPr>
+              <a:t>.lower(), .upper(), .count(), .index()</a:t>
+            </a:r>
+          </a:p>
+          <a:p>
+            <a:r>
+              <a:rPr lang="en-US" dirty="0">
+                <a:latin typeface="Courier New" panose="02070309020205020404" pitchFamily="49" charset="0"/>
+                <a:cs typeface="Courier New" panose="02070309020205020404" pitchFamily="49" charset="0"/>
+              </a:rPr>
+              <a:t>Take 5 mins to try some operations, are there any surprises?</a:t>
+            </a:r>
+          </a:p>
+        </p:txBody>
+      </p:sp>
+      <p:sp>
+        <p:nvSpPr>
+          <p:cNvPr id="6" name="TextBox 5">
+            <a:extLst>
+              <a:ext uri="{FF2B5EF4-FFF2-40B4-BE49-F238E27FC236}">
+                <a16:creationId xmlns:a16="http://schemas.microsoft.com/office/drawing/2014/main" id="{2BC70847-7038-7B40-88E9-508A0A4BD85D}"/>
+              </a:ext>
+            </a:extLst>
+          </p:cNvPr>
+          <p:cNvSpPr txBox="1"/>
+          <p:nvPr/>
+        </p:nvSpPr>
+        <p:spPr>
+          <a:xfrm>
+            <a:off x="4729654" y="1259148"/>
+            <a:ext cx="4414346" cy="3754874"/>
+          </a:xfrm>
+          <a:prstGeom prst="rect">
+            <a:avLst/>
+          </a:prstGeom>
+          <a:noFill/>
+        </p:spPr>
+        <p:txBody>
+          <a:bodyPr wrap="square" rtlCol="0">
+            <a:spAutoFit/>
+          </a:bodyPr>
+          <a:lstStyle/>
+          <a:p>
+            <a:r>
+              <a:rPr lang="en-US" sz="1400" dirty="0">
+                <a:latin typeface="Courier New" panose="02070309020205020404" pitchFamily="49" charset="0"/>
+                <a:cs typeface="Courier New" panose="02070309020205020404" pitchFamily="49" charset="0"/>
+              </a:rPr>
+              <a:t>&gt;&gt;&gt;"hello" &lt; "</a:t>
+            </a:r>
+            <a:r>
+              <a:rPr lang="en-US" sz="1400" dirty="0" err="1">
+                <a:latin typeface="Courier New" panose="02070309020205020404" pitchFamily="49" charset="0"/>
+                <a:cs typeface="Courier New" panose="02070309020205020404" pitchFamily="49" charset="0"/>
+              </a:rPr>
+              <a:t>jello</a:t>
+            </a:r>
+            <a:r>
+              <a:rPr lang="en-US" sz="1400" dirty="0">
+                <a:latin typeface="Courier New" panose="02070309020205020404" pitchFamily="49" charset="0"/>
+                <a:cs typeface="Courier New" panose="02070309020205020404" pitchFamily="49" charset="0"/>
+              </a:rPr>
+              <a:t>" # comparison, compares each letter at a time, the letter that later in the alphabet is 'larger'</a:t>
+            </a:r>
+          </a:p>
+          <a:p>
+            <a:r>
+              <a:rPr lang="en-US" sz="1400" dirty="0">
+                <a:latin typeface="Courier New" panose="02070309020205020404" pitchFamily="49" charset="0"/>
+                <a:cs typeface="Courier New" panose="02070309020205020404" pitchFamily="49" charset="0"/>
+              </a:rPr>
+              <a:t>True</a:t>
+            </a:r>
+          </a:p>
+          <a:p>
+            <a:endParaRPr lang="en-US" sz="1400" dirty="0">
+              <a:latin typeface="Courier New" panose="02070309020205020404" pitchFamily="49" charset="0"/>
+              <a:cs typeface="Courier New" panose="02070309020205020404" pitchFamily="49" charset="0"/>
+            </a:endParaRPr>
+          </a:p>
+          <a:p>
+            <a:r>
+              <a:rPr lang="en-US" sz="1400" dirty="0">
+                <a:latin typeface="Courier New" panose="02070309020205020404" pitchFamily="49" charset="0"/>
+                <a:cs typeface="Courier New" panose="02070309020205020404" pitchFamily="49" charset="0"/>
+              </a:rPr>
+              <a:t>&gt;&gt;&gt;2 &gt;= 2 # greater or equal </a:t>
+            </a:r>
+          </a:p>
+          <a:p>
+            <a:r>
+              <a:rPr lang="en-US" sz="1400" dirty="0">
+                <a:latin typeface="Courier New" panose="02070309020205020404" pitchFamily="49" charset="0"/>
+                <a:cs typeface="Courier New" panose="02070309020205020404" pitchFamily="49" charset="0"/>
+              </a:rPr>
+              <a:t>True</a:t>
+            </a:r>
+          </a:p>
+          <a:p>
+            <a:endParaRPr lang="en-US" sz="1400" dirty="0">
+              <a:latin typeface="Courier New" panose="02070309020205020404" pitchFamily="49" charset="0"/>
+              <a:cs typeface="Courier New" panose="02070309020205020404" pitchFamily="49" charset="0"/>
+            </a:endParaRPr>
+          </a:p>
+          <a:p>
+            <a:r>
+              <a:rPr lang="en-US" sz="1400" dirty="0">
+                <a:latin typeface="Courier New" panose="02070309020205020404" pitchFamily="49" charset="0"/>
+                <a:cs typeface="Courier New" panose="02070309020205020404" pitchFamily="49" charset="0"/>
+              </a:rPr>
+              <a:t>&gt;&gt;&gt;a = 5 </a:t>
+            </a:r>
+          </a:p>
+          <a:p>
+            <a:r>
+              <a:rPr lang="en-US" sz="1400" dirty="0">
+                <a:latin typeface="Courier New" panose="02070309020205020404" pitchFamily="49" charset="0"/>
+                <a:cs typeface="Courier New" panose="02070309020205020404" pitchFamily="49" charset="0"/>
+              </a:rPr>
+              <a:t>&gt;&gt;&gt;a += 5 # same as a = a + 5</a:t>
+            </a:r>
+          </a:p>
+          <a:p>
+            <a:r>
+              <a:rPr lang="en-US" sz="1400" dirty="0">
+                <a:latin typeface="Courier New" panose="02070309020205020404" pitchFamily="49" charset="0"/>
+                <a:cs typeface="Courier New" panose="02070309020205020404" pitchFamily="49" charset="0"/>
+              </a:rPr>
+              <a:t>&gt;&gt;&gt;print(a)</a:t>
+            </a:r>
+          </a:p>
+          <a:p>
+            <a:r>
+              <a:rPr lang="en-US" sz="1400" dirty="0">
+                <a:latin typeface="Courier New" panose="02070309020205020404" pitchFamily="49" charset="0"/>
+                <a:cs typeface="Courier New" panose="02070309020205020404" pitchFamily="49" charset="0"/>
+              </a:rPr>
+              <a:t>10</a:t>
+            </a:r>
+          </a:p>
+          <a:p>
+            <a:endParaRPr lang="en-US" sz="1400" dirty="0">
+              <a:latin typeface="Courier New" panose="02070309020205020404" pitchFamily="49" charset="0"/>
+              <a:cs typeface="Courier New" panose="02070309020205020404" pitchFamily="49" charset="0"/>
+            </a:endParaRPr>
+          </a:p>
+          <a:p>
+            <a:r>
+              <a:rPr lang="en-US" sz="1400" dirty="0">
+                <a:latin typeface="Courier New" panose="02070309020205020404" pitchFamily="49" charset="0"/>
+                <a:cs typeface="Courier New" panose="02070309020205020404" pitchFamily="49" charset="0"/>
+              </a:rPr>
+              <a:t>&gt;&gt;&gt;”</a:t>
+            </a:r>
+            <a:r>
+              <a:rPr lang="en-US" sz="1400" dirty="0" err="1">
+                <a:latin typeface="Courier New" panose="02070309020205020404" pitchFamily="49" charset="0"/>
+                <a:cs typeface="Courier New" panose="02070309020205020404" pitchFamily="49" charset="0"/>
+              </a:rPr>
+              <a:t>hello”.upper</a:t>
+            </a:r>
+            <a:r>
+              <a:rPr lang="en-US" sz="1400" dirty="0">
+                <a:latin typeface="Courier New" panose="02070309020205020404" pitchFamily="49" charset="0"/>
+                <a:cs typeface="Courier New" panose="02070309020205020404" pitchFamily="49" charset="0"/>
+              </a:rPr>
+              <a:t>() # all characters become uppercase</a:t>
+            </a:r>
+            <a:br>
+              <a:rPr lang="en-US" sz="1400" dirty="0">
+                <a:latin typeface="Courier New" panose="02070309020205020404" pitchFamily="49" charset="0"/>
+                <a:cs typeface="Courier New" panose="02070309020205020404" pitchFamily="49" charset="0"/>
+              </a:rPr>
+            </a:br>
+            <a:r>
+              <a:rPr lang="en-US" sz="1400" dirty="0">
+                <a:latin typeface="Courier New" panose="02070309020205020404" pitchFamily="49" charset="0"/>
+                <a:cs typeface="Courier New" panose="02070309020205020404" pitchFamily="49" charset="0"/>
+              </a:rPr>
+              <a:t>’HELLO’</a:t>
+            </a:r>
+          </a:p>
+        </p:txBody>
+      </p:sp>
+    </p:spTree>
+    <p:extLst>
+      <p:ext uri="{BB962C8B-B14F-4D97-AF65-F5344CB8AC3E}">
+        <p14:creationId xmlns:p14="http://schemas.microsoft.com/office/powerpoint/2010/main" val="1506647160"/>
+      </p:ext>
+    </p:extLst>
+  </p:cSld>
+  <p:clrMapOvr>
+    <a:masterClrMapping/>
+  </p:clrMapOvr>
+</p:sld>
+</file>
+
+<file path=ppt/slides/slide9.xml><?xml version="1.0" encoding="utf-8"?>
+<p:sld xmlns:a="http://schemas.openxmlformats.org/drawingml/2006/main" xmlns:r="http://schemas.openxmlformats.org/officeDocument/2006/relationships" xmlns:p="http://schemas.openxmlformats.org/presentationml/2006/main">
+  <p:cSld>
+    <p:spTree>
+      <p:nvGrpSpPr>
+        <p:cNvPr id="1" name=""/>
+        <p:cNvGrpSpPr/>
+        <p:nvPr/>
+      </p:nvGrpSpPr>
+      <p:grpSpPr>
+        <a:xfrm>
+          <a:off x="0" y="0"/>
+          <a:ext cx="0" cy="0"/>
+          <a:chOff x="0" y="0"/>
+          <a:chExt cx="0" cy="0"/>
+        </a:xfrm>
+      </p:grpSpPr>
+      <p:sp>
+        <p:nvSpPr>
+          <p:cNvPr id="2" name="Title 1">
+            <a:extLst>
+              <a:ext uri="{FF2B5EF4-FFF2-40B4-BE49-F238E27FC236}">
+                <a16:creationId xmlns:a16="http://schemas.microsoft.com/office/drawing/2014/main" id="{F889A6B4-ABC8-164D-A645-842681269F09}"/>
+              </a:ext>
+            </a:extLst>
+          </p:cNvPr>
+          <p:cNvSpPr>
+            <a:spLocks noGrp="1"/>
+          </p:cNvSpPr>
+          <p:nvPr>
+            <p:ph type="title"/>
+          </p:nvPr>
+        </p:nvSpPr>
+        <p:spPr/>
+        <p:txBody>
+          <a:bodyPr/>
+          <a:lstStyle/>
+          <a:p>
+            <a:r>
+              <a:rPr lang="en-US"/>
+              <a:t>Lists</a:t>
+            </a:r>
+            <a:endParaRPr lang="en-US" dirty="0"/>
+          </a:p>
+        </p:txBody>
+      </p:sp>
+      <p:sp>
+        <p:nvSpPr>
+          <p:cNvPr id="3" name="TextBox 2">
+            <a:extLst>
+              <a:ext uri="{FF2B5EF4-FFF2-40B4-BE49-F238E27FC236}">
+                <a16:creationId xmlns:a16="http://schemas.microsoft.com/office/drawing/2014/main" id="{6D3B0E03-0AE4-244E-971F-8A8306CFA7E3}"/>
+              </a:ext>
+            </a:extLst>
+          </p:cNvPr>
+          <p:cNvSpPr txBox="1"/>
+          <p:nvPr/>
+        </p:nvSpPr>
+        <p:spPr>
+          <a:xfrm>
+            <a:off x="378372" y="2167758"/>
+            <a:ext cx="8040414" cy="3539430"/>
+          </a:xfrm>
+          <a:prstGeom prst="rect">
+            <a:avLst/>
+          </a:prstGeom>
+          <a:noFill/>
+        </p:spPr>
+        <p:txBody>
+          <a:bodyPr wrap="square" rtlCol="0">
+            <a:spAutoFit/>
+          </a:bodyPr>
+          <a:lstStyle/>
+          <a:p>
+            <a:r>
+              <a:rPr lang="en-US" sz="2800" dirty="0">
+                <a:latin typeface="Courier New" panose="02070309020205020404" pitchFamily="49" charset="0"/>
+                <a:cs typeface="Courier New" panose="02070309020205020404" pitchFamily="49" charset="0"/>
+              </a:rPr>
+              <a:t># can use 'single quotes' or "double quotes" or """triple quotes"""</a:t>
+            </a:r>
+          </a:p>
+          <a:p>
+            <a:r>
+              <a:rPr lang="en-US" sz="2800" dirty="0">
+                <a:latin typeface="Courier New" panose="02070309020205020404" pitchFamily="49" charset="0"/>
+                <a:cs typeface="Courier New" panose="02070309020205020404" pitchFamily="49" charset="0"/>
+              </a:rPr>
+              <a:t># triple quotes and span multiple lines</a:t>
+            </a:r>
+          </a:p>
+          <a:p>
+            <a:r>
+              <a:rPr lang="en-US" sz="2800" dirty="0">
+                <a:latin typeface="Courier New" panose="02070309020205020404" pitchFamily="49" charset="0"/>
+                <a:cs typeface="Courier New" panose="02070309020205020404" pitchFamily="49" charset="0"/>
+              </a:rPr>
+              <a:t>str_1 = "Hello World"</a:t>
+            </a:r>
+          </a:p>
+          <a:p>
+            <a:r>
+              <a:rPr lang="en-US" sz="2800" dirty="0">
+                <a:latin typeface="Courier New" panose="02070309020205020404" pitchFamily="49" charset="0"/>
+                <a:cs typeface="Courier New" panose="02070309020205020404" pitchFamily="49" charset="0"/>
+              </a:rPr>
+              <a:t>str_2 = '100'</a:t>
+            </a:r>
+          </a:p>
+          <a:p>
+            <a:r>
+              <a:rPr lang="en-US" sz="2800" dirty="0">
+                <a:latin typeface="Courier New" panose="02070309020205020404" pitchFamily="49" charset="0"/>
+                <a:cs typeface="Courier New" panose="02070309020205020404" pitchFamily="49" charset="0"/>
+              </a:rPr>
+              <a:t>str_3 = """</a:t>
+            </a:r>
+            <a:r>
+              <a:rPr lang="en-US" sz="2800" dirty="0" err="1">
+                <a:latin typeface="Courier New" panose="02070309020205020404" pitchFamily="49" charset="0"/>
+                <a:cs typeface="Courier New" panose="02070309020205020404" pitchFamily="49" charset="0"/>
+              </a:rPr>
+              <a:t>sdgwerg</a:t>
+            </a:r>
+            <a:r>
+              <a:rPr lang="en-US" sz="2800" dirty="0">
+                <a:latin typeface="Courier New" panose="02070309020205020404" pitchFamily="49" charset="0"/>
+                <a:cs typeface="Courier New" panose="02070309020205020404" pitchFamily="49" charset="0"/>
+              </a:rPr>
+              <a:t>@#$@</a:t>
+            </a:r>
+          </a:p>
+          <a:p>
+            <a:r>
+              <a:rPr lang="en-US" sz="2800" dirty="0">
+                <a:latin typeface="Courier New" panose="02070309020205020404" pitchFamily="49" charset="0"/>
+                <a:cs typeface="Courier New" panose="02070309020205020404" pitchFamily="49" charset="0"/>
+              </a:rPr>
+              <a:t>			 #$%343 """</a:t>
+            </a:r>
+          </a:p>
+        </p:txBody>
+      </p:sp>
+      <p:sp>
+        <p:nvSpPr>
+          <p:cNvPr id="4" name="TextBox 3">
+            <a:extLst>
+              <a:ext uri="{FF2B5EF4-FFF2-40B4-BE49-F238E27FC236}">
+                <a16:creationId xmlns:a16="http://schemas.microsoft.com/office/drawing/2014/main" id="{46248A77-B36C-D941-99FE-A27742D1BAD3}"/>
+              </a:ext>
+            </a:extLst>
+          </p:cNvPr>
+          <p:cNvSpPr txBox="1"/>
+          <p:nvPr/>
+        </p:nvSpPr>
+        <p:spPr>
+          <a:xfrm>
+            <a:off x="378372" y="1462087"/>
+            <a:ext cx="8040414" cy="523220"/>
+          </a:xfrm>
+          <a:prstGeom prst="rect">
+            <a:avLst/>
+          </a:prstGeom>
+          <a:noFill/>
+        </p:spPr>
+        <p:txBody>
+          <a:bodyPr wrap="square" rtlCol="0">
+            <a:spAutoFit/>
+          </a:bodyPr>
+          <a:lstStyle/>
+          <a:p>
+            <a:r>
+              <a:rPr lang="en-US" sz="2800" dirty="0">
+                <a:latin typeface="Helvetica Light" panose="020B0403020202020204" pitchFamily="34" charset="0"/>
+              </a:rPr>
+              <a:t>Strings store text or any series of characters</a:t>
+            </a:r>
+          </a:p>
+        </p:txBody>
+      </p:sp>
+    </p:spTree>
+    <p:extLst>
+      <p:ext uri="{BB962C8B-B14F-4D97-AF65-F5344CB8AC3E}">
+        <p14:creationId xmlns:p14="http://schemas.microsoft.com/office/powerpoint/2010/main" val="3332739731"/>
       </p:ext>
     </p:extLst>
   </p:cSld>

</xml_diff>

<commit_message>
finished lecture 1 README.md
</commit_message>
<xml_diff>
--- a/01_introduction_to_python/slides.pptx
+++ b/01_introduction_to_python/slides.pptx
@@ -5,7 +5,7 @@
     <p:sldMasterId id="2147483660" r:id="rId1"/>
   </p:sldMasterIdLst>
   <p:notesMasterIdLst>
-    <p:notesMasterId r:id="rId11"/>
+    <p:notesMasterId r:id="rId13"/>
   </p:notesMasterIdLst>
   <p:sldIdLst>
     <p:sldId id="256" r:id="rId2"/>
@@ -17,6 +17,8 @@
     <p:sldId id="262" r:id="rId8"/>
     <p:sldId id="263" r:id="rId9"/>
     <p:sldId id="264" r:id="rId10"/>
+    <p:sldId id="266" r:id="rId11"/>
+    <p:sldId id="265" r:id="rId12"/>
   </p:sldIdLst>
   <p:sldSz cx="9144000" cy="6858000" type="screen4x3"/>
   <p:notesSz cx="6858000" cy="9144000"/>
@@ -547,6 +549,90 @@
     <p:extLst>
       <p:ext uri="{BB962C8B-B14F-4D97-AF65-F5344CB8AC3E}">
         <p14:creationId xmlns:p14="http://schemas.microsoft.com/office/powerpoint/2010/main" val="3130002490"/>
+      </p:ext>
+    </p:extLst>
+  </p:cSld>
+  <p:clrMapOvr>
+    <a:masterClrMapping/>
+  </p:clrMapOvr>
+</p:notes>
+</file>
+
+<file path=ppt/notesSlides/notesSlide2.xml><?xml version="1.0" encoding="utf-8"?>
+<p:notes xmlns:a="http://schemas.openxmlformats.org/drawingml/2006/main" xmlns:r="http://schemas.openxmlformats.org/officeDocument/2006/relationships" xmlns:p="http://schemas.openxmlformats.org/presentationml/2006/main">
+  <p:cSld>
+    <p:spTree>
+      <p:nvGrpSpPr>
+        <p:cNvPr id="1" name=""/>
+        <p:cNvGrpSpPr/>
+        <p:nvPr/>
+      </p:nvGrpSpPr>
+      <p:grpSpPr>
+        <a:xfrm>
+          <a:off x="0" y="0"/>
+          <a:ext cx="0" cy="0"/>
+          <a:chOff x="0" y="0"/>
+          <a:chExt cx="0" cy="0"/>
+        </a:xfrm>
+      </p:grpSpPr>
+      <p:sp>
+        <p:nvSpPr>
+          <p:cNvPr id="2" name="Slide Image Placeholder 1"/>
+          <p:cNvSpPr>
+            <a:spLocks noGrp="1" noRot="1" noChangeAspect="1"/>
+          </p:cNvSpPr>
+          <p:nvPr>
+            <p:ph type="sldImg"/>
+          </p:nvPr>
+        </p:nvSpPr>
+        <p:spPr/>
+      </p:sp>
+      <p:sp>
+        <p:nvSpPr>
+          <p:cNvPr id="3" name="Notes Placeholder 2"/>
+          <p:cNvSpPr>
+            <a:spLocks noGrp="1"/>
+          </p:cNvSpPr>
+          <p:nvPr>
+            <p:ph type="body" idx="1"/>
+          </p:nvPr>
+        </p:nvSpPr>
+        <p:spPr/>
+        <p:txBody>
+          <a:bodyPr/>
+          <a:lstStyle/>
+          <a:p>
+            <a:endParaRPr lang="en-US" dirty="0"/>
+          </a:p>
+        </p:txBody>
+      </p:sp>
+      <p:sp>
+        <p:nvSpPr>
+          <p:cNvPr id="4" name="Slide Number Placeholder 3"/>
+          <p:cNvSpPr>
+            <a:spLocks noGrp="1"/>
+          </p:cNvSpPr>
+          <p:nvPr>
+            <p:ph type="sldNum" sz="quarter" idx="5"/>
+          </p:nvPr>
+        </p:nvSpPr>
+        <p:spPr/>
+        <p:txBody>
+          <a:bodyPr/>
+          <a:lstStyle/>
+          <a:p>
+            <a:fld id="{DD92E604-2188-D74A-A057-CDD40C0C1380}" type="slidenum">
+              <a:rPr lang="en-US" smtClean="0"/>
+              <a:t>10</a:t>
+            </a:fld>
+            <a:endParaRPr lang="en-US"/>
+          </a:p>
+        </p:txBody>
+      </p:sp>
+    </p:spTree>
+    <p:extLst>
+      <p:ext uri="{BB962C8B-B14F-4D97-AF65-F5344CB8AC3E}">
+        <p14:creationId xmlns:p14="http://schemas.microsoft.com/office/powerpoint/2010/main" val="1082264378"/>
       </p:ext>
     </p:extLst>
   </p:cSld>
@@ -3707,6 +3793,554 @@
 </p:sld>
 </file>
 
+<file path=ppt/slides/slide10.xml><?xml version="1.0" encoding="utf-8"?>
+<p:sld xmlns:a="http://schemas.openxmlformats.org/drawingml/2006/main" xmlns:r="http://schemas.openxmlformats.org/officeDocument/2006/relationships" xmlns:p="http://schemas.openxmlformats.org/presentationml/2006/main">
+  <p:cSld>
+    <p:spTree>
+      <p:nvGrpSpPr>
+        <p:cNvPr id="1" name=""/>
+        <p:cNvGrpSpPr/>
+        <p:nvPr/>
+      </p:nvGrpSpPr>
+      <p:grpSpPr>
+        <a:xfrm>
+          <a:off x="0" y="0"/>
+          <a:ext cx="0" cy="0"/>
+          <a:chOff x="0" y="0"/>
+          <a:chExt cx="0" cy="0"/>
+        </a:xfrm>
+      </p:grpSpPr>
+      <p:sp>
+        <p:nvSpPr>
+          <p:cNvPr id="2" name="Title 1">
+            <a:extLst>
+              <a:ext uri="{FF2B5EF4-FFF2-40B4-BE49-F238E27FC236}">
+                <a16:creationId xmlns:a16="http://schemas.microsoft.com/office/drawing/2014/main" id="{F889A6B4-ABC8-164D-A645-842681269F09}"/>
+              </a:ext>
+            </a:extLst>
+          </p:cNvPr>
+          <p:cNvSpPr>
+            <a:spLocks noGrp="1"/>
+          </p:cNvSpPr>
+          <p:nvPr>
+            <p:ph type="title"/>
+          </p:nvPr>
+        </p:nvSpPr>
+        <p:spPr/>
+        <p:txBody>
+          <a:bodyPr/>
+          <a:lstStyle/>
+          <a:p>
+            <a:r>
+              <a:rPr lang="en-US" dirty="0"/>
+              <a:t>List Operations</a:t>
+            </a:r>
+          </a:p>
+        </p:txBody>
+      </p:sp>
+      <p:sp>
+        <p:nvSpPr>
+          <p:cNvPr id="6" name="TextBox 5">
+            <a:extLst>
+              <a:ext uri="{FF2B5EF4-FFF2-40B4-BE49-F238E27FC236}">
+                <a16:creationId xmlns:a16="http://schemas.microsoft.com/office/drawing/2014/main" id="{F5A047C7-F17F-8F45-992B-DB68C0C000FB}"/>
+              </a:ext>
+            </a:extLst>
+          </p:cNvPr>
+          <p:cNvSpPr txBox="1"/>
+          <p:nvPr/>
+        </p:nvSpPr>
+        <p:spPr>
+          <a:xfrm>
+            <a:off x="84082" y="1239173"/>
+            <a:ext cx="4414346" cy="4185761"/>
+          </a:xfrm>
+          <a:prstGeom prst="rect">
+            <a:avLst/>
+          </a:prstGeom>
+          <a:noFill/>
+        </p:spPr>
+        <p:txBody>
+          <a:bodyPr wrap="square" rtlCol="0">
+            <a:spAutoFit/>
+          </a:bodyPr>
+          <a:lstStyle/>
+          <a:p>
+            <a:r>
+              <a:rPr lang="en-US" sz="1400" dirty="0">
+                <a:latin typeface="Courier New" panose="02070309020205020404" pitchFamily="49" charset="0"/>
+                <a:cs typeface="Courier New" panose="02070309020205020404" pitchFamily="49" charset="0"/>
+              </a:rPr>
+              <a:t>&gt;&gt;&gt;[] # empty list</a:t>
+            </a:r>
+          </a:p>
+          <a:p>
+            <a:r>
+              <a:rPr lang="en-US" sz="1400" dirty="0">
+                <a:latin typeface="Courier New" panose="02070309020205020404" pitchFamily="49" charset="0"/>
+                <a:cs typeface="Courier New" panose="02070309020205020404" pitchFamily="49" charset="0"/>
+              </a:rPr>
+              <a:t>[]</a:t>
+            </a:r>
+          </a:p>
+          <a:p>
+            <a:endParaRPr lang="en-US" sz="1400" dirty="0">
+              <a:latin typeface="Courier New" panose="02070309020205020404" pitchFamily="49" charset="0"/>
+              <a:cs typeface="Courier New" panose="02070309020205020404" pitchFamily="49" charset="0"/>
+            </a:endParaRPr>
+          </a:p>
+          <a:p>
+            <a:r>
+              <a:rPr lang="en-US" sz="1400" dirty="0">
+                <a:latin typeface="Courier New" panose="02070309020205020404" pitchFamily="49" charset="0"/>
+                <a:cs typeface="Courier New" panose="02070309020205020404" pitchFamily="49" charset="0"/>
+              </a:rPr>
+              <a:t>&gt;&gt;&gt;</a:t>
+            </a:r>
+            <a:r>
+              <a:rPr lang="en-US" sz="1400" dirty="0" err="1">
+                <a:latin typeface="Courier New" panose="02070309020205020404" pitchFamily="49" charset="0"/>
+                <a:cs typeface="Courier New" panose="02070309020205020404" pitchFamily="49" charset="0"/>
+              </a:rPr>
+              <a:t>len</a:t>
+            </a:r>
+            <a:r>
+              <a:rPr lang="en-US" sz="1400" dirty="0">
+                <a:latin typeface="Courier New" panose="02070309020205020404" pitchFamily="49" charset="0"/>
+                <a:cs typeface="Courier New" panose="02070309020205020404" pitchFamily="49" charset="0"/>
+              </a:rPr>
+              <a:t>([]) # get the number of elements in a list </a:t>
+            </a:r>
+          </a:p>
+          <a:p>
+            <a:r>
+              <a:rPr lang="en-US" sz="1400" dirty="0">
+                <a:latin typeface="Courier New" panose="02070309020205020404" pitchFamily="49" charset="0"/>
+                <a:cs typeface="Courier New" panose="02070309020205020404" pitchFamily="49" charset="0"/>
+              </a:rPr>
+              <a:t>0</a:t>
+            </a:r>
+          </a:p>
+          <a:p>
+            <a:endParaRPr lang="en-US" sz="1400" dirty="0">
+              <a:latin typeface="Courier New" panose="02070309020205020404" pitchFamily="49" charset="0"/>
+              <a:cs typeface="Courier New" panose="02070309020205020404" pitchFamily="49" charset="0"/>
+            </a:endParaRPr>
+          </a:p>
+          <a:p>
+            <a:r>
+              <a:rPr lang="en-US" sz="1400" dirty="0">
+                <a:latin typeface="Courier New" panose="02070309020205020404" pitchFamily="49" charset="0"/>
+                <a:cs typeface="Courier New" panose="02070309020205020404" pitchFamily="49" charset="0"/>
+              </a:rPr>
+              <a:t>&gt;&gt;&gt;a = [99, "hello", ["nested", "list"]] # lists can store any value, even other lists!</a:t>
+            </a:r>
+          </a:p>
+          <a:p>
+            <a:r>
+              <a:rPr lang="en-US" sz="1400" dirty="0">
+                <a:latin typeface="Courier New" panose="02070309020205020404" pitchFamily="49" charset="0"/>
+                <a:cs typeface="Courier New" panose="02070309020205020404" pitchFamily="49" charset="0"/>
+              </a:rPr>
+              <a:t>&gt;&gt;&gt;print(a) # prints the values of the list that is stored in variable 'a'</a:t>
+            </a:r>
+          </a:p>
+          <a:p>
+            <a:r>
+              <a:rPr lang="en-US" sz="1400" dirty="0">
+                <a:latin typeface="Courier New" panose="02070309020205020404" pitchFamily="49" charset="0"/>
+                <a:cs typeface="Courier New" panose="02070309020205020404" pitchFamily="49" charset="0"/>
+              </a:rPr>
+              <a:t>[99, 'hello', ['nested', 'list']]</a:t>
+            </a:r>
+          </a:p>
+          <a:p>
+            <a:endParaRPr lang="en-US" sz="1400" dirty="0">
+              <a:latin typeface="Courier New" panose="02070309020205020404" pitchFamily="49" charset="0"/>
+              <a:cs typeface="Courier New" panose="02070309020205020404" pitchFamily="49" charset="0"/>
+            </a:endParaRPr>
+          </a:p>
+          <a:p>
+            <a:r>
+              <a:rPr lang="en-US" sz="1400" dirty="0">
+                <a:latin typeface="Courier New" panose="02070309020205020404" pitchFamily="49" charset="0"/>
+                <a:cs typeface="Courier New" panose="02070309020205020404" pitchFamily="49" charset="0"/>
+              </a:rPr>
+              <a:t>&gt;&gt;&gt;a = [0, 1]</a:t>
+            </a:r>
+          </a:p>
+          <a:p>
+            <a:r>
+              <a:rPr lang="en-US" sz="1400" dirty="0">
+                <a:latin typeface="Courier New" panose="02070309020205020404" pitchFamily="49" charset="0"/>
+                <a:cs typeface="Courier New" panose="02070309020205020404" pitchFamily="49" charset="0"/>
+              </a:rPr>
+              <a:t>&gt;&gt;&gt;b = [2, 3]</a:t>
+            </a:r>
+          </a:p>
+          <a:p>
+            <a:r>
+              <a:rPr lang="en-US" sz="1400" dirty="0">
+                <a:latin typeface="Courier New" panose="02070309020205020404" pitchFamily="49" charset="0"/>
+                <a:cs typeface="Courier New" panose="02070309020205020404" pitchFamily="49" charset="0"/>
+              </a:rPr>
+              <a:t>&gt;&gt;&gt;a + b # list addition, joins them together </a:t>
+            </a:r>
+          </a:p>
+          <a:p>
+            <a:r>
+              <a:rPr lang="en-US" sz="1400" dirty="0">
+                <a:latin typeface="Courier New" panose="02070309020205020404" pitchFamily="49" charset="0"/>
+                <a:cs typeface="Courier New" panose="02070309020205020404" pitchFamily="49" charset="0"/>
+              </a:rPr>
+              <a:t>[0, 1, 2, 3]</a:t>
+            </a:r>
+          </a:p>
+        </p:txBody>
+      </p:sp>
+      <p:sp>
+        <p:nvSpPr>
+          <p:cNvPr id="7" name="TextBox 6">
+            <a:extLst>
+              <a:ext uri="{FF2B5EF4-FFF2-40B4-BE49-F238E27FC236}">
+                <a16:creationId xmlns:a16="http://schemas.microsoft.com/office/drawing/2014/main" id="{763A4E2A-9243-1147-9DDE-32EE5031F917}"/>
+              </a:ext>
+            </a:extLst>
+          </p:cNvPr>
+          <p:cNvSpPr txBox="1"/>
+          <p:nvPr/>
+        </p:nvSpPr>
+        <p:spPr>
+          <a:xfrm>
+            <a:off x="84082" y="5644203"/>
+            <a:ext cx="8686801" cy="1200329"/>
+          </a:xfrm>
+          <a:prstGeom prst="rect">
+            <a:avLst/>
+          </a:prstGeom>
+          <a:noFill/>
+        </p:spPr>
+        <p:txBody>
+          <a:bodyPr wrap="square" rtlCol="0">
+            <a:spAutoFit/>
+          </a:bodyPr>
+          <a:lstStyle/>
+          <a:p>
+            <a:r>
+              <a:rPr lang="en-US" dirty="0">
+                <a:latin typeface="Courier New" panose="02070309020205020404" pitchFamily="49" charset="0"/>
+                <a:cs typeface="Courier New" panose="02070309020205020404" pitchFamily="49" charset="0"/>
+              </a:rPr>
+              <a:t>All operations: +, *, ==, [], .append(), .clear(), .copy(), .count(), .extend(), .index(), .insert(), .pop(), .remove(), .reverse()</a:t>
+            </a:r>
+          </a:p>
+          <a:p>
+            <a:r>
+              <a:rPr lang="en-US" dirty="0">
+                <a:latin typeface="Courier New" panose="02070309020205020404" pitchFamily="49" charset="0"/>
+                <a:cs typeface="Courier New" panose="02070309020205020404" pitchFamily="49" charset="0"/>
+              </a:rPr>
+              <a:t>Take 5 mins to try some operations, are there any surprises?</a:t>
+            </a:r>
+          </a:p>
+        </p:txBody>
+      </p:sp>
+      <p:sp>
+        <p:nvSpPr>
+          <p:cNvPr id="8" name="TextBox 7">
+            <a:extLst>
+              <a:ext uri="{FF2B5EF4-FFF2-40B4-BE49-F238E27FC236}">
+                <a16:creationId xmlns:a16="http://schemas.microsoft.com/office/drawing/2014/main" id="{B36B7CAC-2E67-594A-8AC8-9C3DFA939612}"/>
+              </a:ext>
+            </a:extLst>
+          </p:cNvPr>
+          <p:cNvSpPr txBox="1"/>
+          <p:nvPr/>
+        </p:nvSpPr>
+        <p:spPr>
+          <a:xfrm>
+            <a:off x="4729654" y="1259148"/>
+            <a:ext cx="4414346" cy="4185761"/>
+          </a:xfrm>
+          <a:prstGeom prst="rect">
+            <a:avLst/>
+          </a:prstGeom>
+          <a:noFill/>
+        </p:spPr>
+        <p:txBody>
+          <a:bodyPr wrap="square" rtlCol="0">
+            <a:spAutoFit/>
+          </a:bodyPr>
+          <a:lstStyle/>
+          <a:p>
+            <a:r>
+              <a:rPr lang="en-US" sz="1400" dirty="0">
+                <a:latin typeface="Courier New" panose="02070309020205020404" pitchFamily="49" charset="0"/>
+                <a:cs typeface="Courier New" panose="02070309020205020404" pitchFamily="49" charset="0"/>
+              </a:rPr>
+              <a:t>&gt;&gt;&gt;a * 3 # list multiplication creates with duplicate elements</a:t>
+            </a:r>
+          </a:p>
+          <a:p>
+            <a:r>
+              <a:rPr lang="en-US" sz="1400" dirty="0">
+                <a:latin typeface="Courier New" panose="02070309020205020404" pitchFamily="49" charset="0"/>
+                <a:cs typeface="Courier New" panose="02070309020205020404" pitchFamily="49" charset="0"/>
+              </a:rPr>
+              <a:t>[0, 1, 0, 1, 0, 1]</a:t>
+            </a:r>
+          </a:p>
+          <a:p>
+            <a:endParaRPr lang="en-US" sz="1400" dirty="0">
+              <a:latin typeface="Courier New" panose="02070309020205020404" pitchFamily="49" charset="0"/>
+              <a:cs typeface="Courier New" panose="02070309020205020404" pitchFamily="49" charset="0"/>
+            </a:endParaRPr>
+          </a:p>
+          <a:p>
+            <a:r>
+              <a:rPr lang="en-US" sz="1400" dirty="0">
+                <a:latin typeface="Courier New" panose="02070309020205020404" pitchFamily="49" charset="0"/>
+                <a:cs typeface="Courier New" panose="02070309020205020404" pitchFamily="49" charset="0"/>
+              </a:rPr>
+              <a:t>&gt;&gt;&gt;a = range(5) # creates a list with elements 0 to 4</a:t>
+            </a:r>
+          </a:p>
+          <a:p>
+            <a:r>
+              <a:rPr lang="en-US" sz="1400" dirty="0">
+                <a:latin typeface="Courier New" panose="02070309020205020404" pitchFamily="49" charset="0"/>
+                <a:cs typeface="Courier New" panose="02070309020205020404" pitchFamily="49" charset="0"/>
+              </a:rPr>
+              <a:t>&gt;&gt;&gt;print(a)</a:t>
+            </a:r>
+          </a:p>
+          <a:p>
+            <a:r>
+              <a:rPr lang="en-US" sz="1400" dirty="0">
+                <a:latin typeface="Courier New" panose="02070309020205020404" pitchFamily="49" charset="0"/>
+                <a:cs typeface="Courier New" panose="02070309020205020404" pitchFamily="49" charset="0"/>
+              </a:rPr>
+              <a:t>[0, 1, 2, 3, 4]</a:t>
+            </a:r>
+          </a:p>
+          <a:p>
+            <a:endParaRPr lang="en-US" sz="1400" dirty="0">
+              <a:latin typeface="Courier New" panose="02070309020205020404" pitchFamily="49" charset="0"/>
+              <a:cs typeface="Courier New" panose="02070309020205020404" pitchFamily="49" charset="0"/>
+            </a:endParaRPr>
+          </a:p>
+          <a:p>
+            <a:r>
+              <a:rPr lang="en-US" sz="1400" dirty="0">
+                <a:latin typeface="Courier New" panose="02070309020205020404" pitchFamily="49" charset="0"/>
+                <a:cs typeface="Courier New" panose="02070309020205020404" pitchFamily="49" charset="0"/>
+              </a:rPr>
+              <a:t>&gt;&gt;&gt;</a:t>
+            </a:r>
+            <a:r>
+              <a:rPr lang="en-US" sz="1400" dirty="0" err="1">
+                <a:latin typeface="Courier New" panose="02070309020205020404" pitchFamily="49" charset="0"/>
+                <a:cs typeface="Courier New" panose="02070309020205020404" pitchFamily="49" charset="0"/>
+              </a:rPr>
+              <a:t>a.append</a:t>
+            </a:r>
+            <a:r>
+              <a:rPr lang="en-US" sz="1400" dirty="0">
+                <a:latin typeface="Courier New" panose="02070309020205020404" pitchFamily="49" charset="0"/>
+                <a:cs typeface="Courier New" panose="02070309020205020404" pitchFamily="49" charset="0"/>
+              </a:rPr>
+              <a:t>(5) # append adds a element to end of a list </a:t>
+            </a:r>
+          </a:p>
+          <a:p>
+            <a:r>
+              <a:rPr lang="en-US" sz="1400" dirty="0">
+                <a:latin typeface="Courier New" panose="02070309020205020404" pitchFamily="49" charset="0"/>
+                <a:cs typeface="Courier New" panose="02070309020205020404" pitchFamily="49" charset="0"/>
+              </a:rPr>
+              <a:t>&gt;&gt;&gt;print(a)</a:t>
+            </a:r>
+          </a:p>
+          <a:p>
+            <a:r>
+              <a:rPr lang="en-US" sz="1400" dirty="0">
+                <a:latin typeface="Courier New" panose="02070309020205020404" pitchFamily="49" charset="0"/>
+                <a:cs typeface="Courier New" panose="02070309020205020404" pitchFamily="49" charset="0"/>
+              </a:rPr>
+              <a:t>[0, 1, 2, 3, 4, 5]</a:t>
+            </a:r>
+          </a:p>
+          <a:p>
+            <a:endParaRPr lang="en-US" sz="1400" dirty="0">
+              <a:latin typeface="Courier New" panose="02070309020205020404" pitchFamily="49" charset="0"/>
+              <a:cs typeface="Courier New" panose="02070309020205020404" pitchFamily="49" charset="0"/>
+            </a:endParaRPr>
+          </a:p>
+          <a:p>
+            <a:r>
+              <a:rPr lang="en-US" sz="1400" dirty="0">
+                <a:latin typeface="Courier New" panose="02070309020205020404" pitchFamily="49" charset="0"/>
+                <a:cs typeface="Courier New" panose="02070309020205020404" pitchFamily="49" charset="0"/>
+              </a:rPr>
+              <a:t>&gt;&gt;&gt;</a:t>
+            </a:r>
+            <a:r>
+              <a:rPr lang="en-US" sz="1400" dirty="0" err="1">
+                <a:latin typeface="Courier New" panose="02070309020205020404" pitchFamily="49" charset="0"/>
+                <a:cs typeface="Courier New" panose="02070309020205020404" pitchFamily="49" charset="0"/>
+              </a:rPr>
+              <a:t>a.pop</a:t>
+            </a:r>
+            <a:r>
+              <a:rPr lang="en-US" sz="1400" dirty="0">
+                <a:latin typeface="Courier New" panose="02070309020205020404" pitchFamily="49" charset="0"/>
+                <a:cs typeface="Courier New" panose="02070309020205020404" pitchFamily="49" charset="0"/>
+              </a:rPr>
+              <a:t>() # removes last element for list and returns it</a:t>
+            </a:r>
+          </a:p>
+          <a:p>
+            <a:r>
+              <a:rPr lang="en-US" sz="1400" dirty="0">
+                <a:latin typeface="Courier New" panose="02070309020205020404" pitchFamily="49" charset="0"/>
+                <a:cs typeface="Courier New" panose="02070309020205020404" pitchFamily="49" charset="0"/>
+              </a:rPr>
+              <a:t>5</a:t>
+            </a:r>
+          </a:p>
+          <a:p>
+            <a:r>
+              <a:rPr lang="en-US" sz="1400" dirty="0">
+                <a:latin typeface="Courier New" panose="02070309020205020404" pitchFamily="49" charset="0"/>
+                <a:cs typeface="Courier New" panose="02070309020205020404" pitchFamily="49" charset="0"/>
+              </a:rPr>
+              <a:t>&gt;&gt;&gt;print(a)</a:t>
+            </a:r>
+          </a:p>
+          <a:p>
+            <a:r>
+              <a:rPr lang="en-US" sz="1400" dirty="0">
+                <a:latin typeface="Courier New" panose="02070309020205020404" pitchFamily="49" charset="0"/>
+                <a:cs typeface="Courier New" panose="02070309020205020404" pitchFamily="49" charset="0"/>
+              </a:rPr>
+              <a:t>[0, 1, 2, 3, 4]</a:t>
+            </a:r>
+          </a:p>
+        </p:txBody>
+      </p:sp>
+    </p:spTree>
+    <p:extLst>
+      <p:ext uri="{BB962C8B-B14F-4D97-AF65-F5344CB8AC3E}">
+        <p14:creationId xmlns:p14="http://schemas.microsoft.com/office/powerpoint/2010/main" val="1713265156"/>
+      </p:ext>
+    </p:extLst>
+  </p:cSld>
+  <p:clrMapOvr>
+    <a:masterClrMapping/>
+  </p:clrMapOvr>
+</p:sld>
+</file>
+
+<file path=ppt/slides/slide11.xml><?xml version="1.0" encoding="utf-8"?>
+<p:sld xmlns:a="http://schemas.openxmlformats.org/drawingml/2006/main" xmlns:r="http://schemas.openxmlformats.org/officeDocument/2006/relationships" xmlns:p="http://schemas.openxmlformats.org/presentationml/2006/main">
+  <p:cSld>
+    <p:spTree>
+      <p:nvGrpSpPr>
+        <p:cNvPr id="1" name=""/>
+        <p:cNvGrpSpPr/>
+        <p:nvPr/>
+      </p:nvGrpSpPr>
+      <p:grpSpPr>
+        <a:xfrm>
+          <a:off x="0" y="0"/>
+          <a:ext cx="0" cy="0"/>
+          <a:chOff x="0" y="0"/>
+          <a:chExt cx="0" cy="0"/>
+        </a:xfrm>
+      </p:grpSpPr>
+      <p:sp>
+        <p:nvSpPr>
+          <p:cNvPr id="4" name="Title 1">
+            <a:extLst>
+              <a:ext uri="{FF2B5EF4-FFF2-40B4-BE49-F238E27FC236}">
+                <a16:creationId xmlns:a16="http://schemas.microsoft.com/office/drawing/2014/main" id="{9CC827F5-D280-CC4F-828E-E086D6C8A2E0}"/>
+              </a:ext>
+            </a:extLst>
+          </p:cNvPr>
+          <p:cNvSpPr>
+            <a:spLocks noGrp="1"/>
+          </p:cNvSpPr>
+          <p:nvPr>
+            <p:ph type="title"/>
+          </p:nvPr>
+        </p:nvSpPr>
+        <p:spPr>
+          <a:xfrm>
+            <a:off x="628650" y="136524"/>
+            <a:ext cx="7886700" cy="1325563"/>
+          </a:xfrm>
+        </p:spPr>
+        <p:txBody>
+          <a:bodyPr/>
+          <a:lstStyle/>
+          <a:p>
+            <a:r>
+              <a:rPr lang="en-US" dirty="0"/>
+              <a:t>Practice Problem</a:t>
+            </a:r>
+          </a:p>
+        </p:txBody>
+      </p:sp>
+      <p:sp>
+        <p:nvSpPr>
+          <p:cNvPr id="5" name="TextBox 4">
+            <a:extLst>
+              <a:ext uri="{FF2B5EF4-FFF2-40B4-BE49-F238E27FC236}">
+                <a16:creationId xmlns:a16="http://schemas.microsoft.com/office/drawing/2014/main" id="{505A9EF6-F240-3344-8593-616570BDC74F}"/>
+              </a:ext>
+            </a:extLst>
+          </p:cNvPr>
+          <p:cNvSpPr txBox="1"/>
+          <p:nvPr/>
+        </p:nvSpPr>
+        <p:spPr>
+          <a:xfrm>
+            <a:off x="474936" y="2775880"/>
+            <a:ext cx="8040414" cy="954107"/>
+          </a:xfrm>
+          <a:prstGeom prst="rect">
+            <a:avLst/>
+          </a:prstGeom>
+          <a:noFill/>
+        </p:spPr>
+        <p:txBody>
+          <a:bodyPr wrap="square" rtlCol="0">
+            <a:spAutoFit/>
+          </a:bodyPr>
+          <a:lstStyle/>
+          <a:p>
+            <a:r>
+              <a:rPr lang="en-US" sz="2800" dirty="0">
+                <a:latin typeface="Helvetica Light" panose="020B0403020202020204" pitchFamily="34" charset="0"/>
+              </a:rPr>
+              <a:t>Write a program that takes a number as an input and prints out whether it is odd or even</a:t>
+            </a:r>
+          </a:p>
+        </p:txBody>
+      </p:sp>
+    </p:spTree>
+    <p:extLst>
+      <p:ext uri="{BB962C8B-B14F-4D97-AF65-F5344CB8AC3E}">
+        <p14:creationId xmlns:p14="http://schemas.microsoft.com/office/powerpoint/2010/main" val="2829463214"/>
+      </p:ext>
+    </p:extLst>
+  </p:cSld>
+  <p:clrMapOvr>
+    <a:masterClrMapping/>
+  </p:clrMapOvr>
+</p:sld>
+</file>
+
 <file path=ppt/slides/slide2.xml><?xml version="1.0" encoding="utf-8"?>
 <p:sld xmlns:a="http://schemas.openxmlformats.org/drawingml/2006/main" xmlns:r="http://schemas.openxmlformats.org/officeDocument/2006/relationships" xmlns:p="http://schemas.openxmlformats.org/presentationml/2006/main">
   <p:cSld>
@@ -5532,106 +6166,8 @@
           <a:lstStyle/>
           <a:p>
             <a:r>
-              <a:rPr lang="en-US"/>
+              <a:rPr lang="en-US" dirty="0"/>
               <a:t>Lists</a:t>
-            </a:r>
-            <a:endParaRPr lang="en-US" dirty="0"/>
-          </a:p>
-        </p:txBody>
-      </p:sp>
-      <p:sp>
-        <p:nvSpPr>
-          <p:cNvPr id="3" name="TextBox 2">
-            <a:extLst>
-              <a:ext uri="{FF2B5EF4-FFF2-40B4-BE49-F238E27FC236}">
-                <a16:creationId xmlns:a16="http://schemas.microsoft.com/office/drawing/2014/main" id="{6D3B0E03-0AE4-244E-971F-8A8306CFA7E3}"/>
-              </a:ext>
-            </a:extLst>
-          </p:cNvPr>
-          <p:cNvSpPr txBox="1"/>
-          <p:nvPr/>
-        </p:nvSpPr>
-        <p:spPr>
-          <a:xfrm>
-            <a:off x="378372" y="2167758"/>
-            <a:ext cx="8040414" cy="3539430"/>
-          </a:xfrm>
-          <a:prstGeom prst="rect">
-            <a:avLst/>
-          </a:prstGeom>
-          <a:noFill/>
-        </p:spPr>
-        <p:txBody>
-          <a:bodyPr wrap="square" rtlCol="0">
-            <a:spAutoFit/>
-          </a:bodyPr>
-          <a:lstStyle/>
-          <a:p>
-            <a:r>
-              <a:rPr lang="en-US" sz="2800" dirty="0">
-                <a:latin typeface="Courier New" panose="02070309020205020404" pitchFamily="49" charset="0"/>
-                <a:cs typeface="Courier New" panose="02070309020205020404" pitchFamily="49" charset="0"/>
-              </a:rPr>
-              <a:t># can use 'single quotes' or "double quotes" or """triple quotes"""</a:t>
-            </a:r>
-          </a:p>
-          <a:p>
-            <a:r>
-              <a:rPr lang="en-US" sz="2800" dirty="0">
-                <a:latin typeface="Courier New" panose="02070309020205020404" pitchFamily="49" charset="0"/>
-                <a:cs typeface="Courier New" panose="02070309020205020404" pitchFamily="49" charset="0"/>
-              </a:rPr>
-              <a:t># triple quotes and span multiple lines</a:t>
-            </a:r>
-          </a:p>
-          <a:p>
-            <a:r>
-              <a:rPr lang="en-US" sz="2800" dirty="0">
-                <a:latin typeface="Courier New" panose="02070309020205020404" pitchFamily="49" charset="0"/>
-                <a:cs typeface="Courier New" panose="02070309020205020404" pitchFamily="49" charset="0"/>
-              </a:rPr>
-              <a:t>str_1 = "Hello World"</a:t>
-            </a:r>
-          </a:p>
-          <a:p>
-            <a:r>
-              <a:rPr lang="en-US" sz="2800" dirty="0">
-                <a:latin typeface="Courier New" panose="02070309020205020404" pitchFamily="49" charset="0"/>
-                <a:cs typeface="Courier New" panose="02070309020205020404" pitchFamily="49" charset="0"/>
-              </a:rPr>
-              <a:t>str_2 = '100'</a:t>
-            </a:r>
-          </a:p>
-          <a:p>
-            <a:r>
-              <a:rPr lang="en-US" sz="2800" dirty="0">
-                <a:latin typeface="Courier New" panose="02070309020205020404" pitchFamily="49" charset="0"/>
-                <a:cs typeface="Courier New" panose="02070309020205020404" pitchFamily="49" charset="0"/>
-              </a:rPr>
-              <a:t>str_3 = """</a:t>
-            </a:r>
-            <a:r>
-              <a:rPr lang="en-US" sz="2800" dirty="0" err="1">
-                <a:latin typeface="Courier New" panose="02070309020205020404" pitchFamily="49" charset="0"/>
-                <a:cs typeface="Courier New" panose="02070309020205020404" pitchFamily="49" charset="0"/>
-              </a:rPr>
-              <a:t>sdgwerg</a:t>
-            </a:r>
-            <a:r>
-              <a:rPr lang="en-US" sz="2800" dirty="0">
-                <a:latin typeface="Courier New" panose="02070309020205020404" pitchFamily="49" charset="0"/>
-                <a:cs typeface="Courier New" panose="02070309020205020404" pitchFamily="49" charset="0"/>
-              </a:rPr>
-              <a:t>@#$@</a:t>
-            </a:r>
-          </a:p>
-          <a:p>
-            <a:r>
-              <a:rPr lang="en-US" sz="2800" dirty="0">
-                <a:latin typeface="Courier New" panose="02070309020205020404" pitchFamily="49" charset="0"/>
-                <a:cs typeface="Courier New" panose="02070309020205020404" pitchFamily="49" charset="0"/>
-              </a:rPr>
-              <a:t>			 #$%343 """</a:t>
             </a:r>
           </a:p>
         </p:txBody>
@@ -5650,7 +6186,7 @@
         </p:nvSpPr>
         <p:spPr>
           <a:xfrm>
-            <a:off x="378372" y="1462087"/>
+            <a:off x="367862" y="1200477"/>
             <a:ext cx="8040414" cy="523220"/>
           </a:xfrm>
           <a:prstGeom prst="rect">
@@ -5668,7 +6204,63 @@
               <a:rPr lang="en-US" sz="2800" dirty="0">
                 <a:latin typeface="Helvetica Light" panose="020B0403020202020204" pitchFamily="34" charset="0"/>
               </a:rPr>
-              <a:t>Strings store text or any series of characters</a:t>
+              <a:t>A series of elements, initialized with []</a:t>
+            </a:r>
+          </a:p>
+        </p:txBody>
+      </p:sp>
+      <p:sp>
+        <p:nvSpPr>
+          <p:cNvPr id="5" name="TextBox 4">
+            <a:extLst>
+              <a:ext uri="{FF2B5EF4-FFF2-40B4-BE49-F238E27FC236}">
+                <a16:creationId xmlns:a16="http://schemas.microsoft.com/office/drawing/2014/main" id="{4155F63F-50FB-F949-B008-740E6C10850F}"/>
+              </a:ext>
+            </a:extLst>
+          </p:cNvPr>
+          <p:cNvSpPr txBox="1"/>
+          <p:nvPr/>
+        </p:nvSpPr>
+        <p:spPr>
+          <a:xfrm>
+            <a:off x="378372" y="2167758"/>
+            <a:ext cx="8040414" cy="3108543"/>
+          </a:xfrm>
+          <a:prstGeom prst="rect">
+            <a:avLst/>
+          </a:prstGeom>
+          <a:noFill/>
+        </p:spPr>
+        <p:txBody>
+          <a:bodyPr wrap="square" rtlCol="0">
+            <a:spAutoFit/>
+          </a:bodyPr>
+          <a:lstStyle/>
+          <a:p>
+            <a:r>
+              <a:rPr lang="en-US" sz="2800" dirty="0">
+                <a:latin typeface="Courier New" panose="02070309020205020404" pitchFamily="49" charset="0"/>
+                <a:cs typeface="Courier New" panose="02070309020205020404" pitchFamily="49" charset="0"/>
+              </a:rPr>
+              <a:t>list_1 = [] # empty list </a:t>
+            </a:r>
+          </a:p>
+          <a:p>
+            <a:r>
+              <a:rPr lang="en-US" sz="2800" dirty="0">
+                <a:latin typeface="Courier New" panose="02070309020205020404" pitchFamily="49" charset="0"/>
+                <a:cs typeface="Courier New" panose="02070309020205020404" pitchFamily="49" charset="0"/>
+              </a:rPr>
+              <a:t>list_2 = [1, 2] # a list of two elements, first is 1 and second is 2</a:t>
+            </a:r>
+          </a:p>
+          <a:p>
+            <a:r>
+              <a:rPr lang="en-US" sz="2800" dirty="0">
+                <a:latin typeface="Courier New" panose="02070309020205020404" pitchFamily="49" charset="0"/>
+                <a:cs typeface="Courier New" panose="02070309020205020404" pitchFamily="49" charset="0"/>
+              </a:rPr>
+              <a:t>list_3 = [“element_1”, 1, [“sub”, ”list]] # lists can be composed on any of the other types even other lists! </a:t>
             </a:r>
           </a:p>
         </p:txBody>

</xml_diff>